<commit_message>
Updates to Lesson 5 slides.
</commit_message>
<xml_diff>
--- a/slides/Lesson5.pptx
+++ b/slides/Lesson5.pptx
@@ -5,7 +5,7 @@
     <p:sldMasterId id="2147483814" r:id="rId1"/>
   </p:sldMasterIdLst>
   <p:notesMasterIdLst>
-    <p:notesMasterId r:id="rId31"/>
+    <p:notesMasterId r:id="rId33"/>
   </p:notesMasterIdLst>
   <p:sldIdLst>
     <p:sldId id="256" r:id="rId2"/>
@@ -27,16 +27,18 @@
     <p:sldId id="378" r:id="rId18"/>
     <p:sldId id="394" r:id="rId19"/>
     <p:sldId id="395" r:id="rId20"/>
-    <p:sldId id="279" r:id="rId21"/>
-    <p:sldId id="385" r:id="rId22"/>
-    <p:sldId id="386" r:id="rId23"/>
-    <p:sldId id="387" r:id="rId24"/>
-    <p:sldId id="389" r:id="rId25"/>
-    <p:sldId id="390" r:id="rId26"/>
-    <p:sldId id="391" r:id="rId27"/>
-    <p:sldId id="388" r:id="rId28"/>
-    <p:sldId id="345" r:id="rId29"/>
-    <p:sldId id="262" r:id="rId30"/>
+    <p:sldId id="397" r:id="rId21"/>
+    <p:sldId id="279" r:id="rId22"/>
+    <p:sldId id="396" r:id="rId23"/>
+    <p:sldId id="385" r:id="rId24"/>
+    <p:sldId id="386" r:id="rId25"/>
+    <p:sldId id="387" r:id="rId26"/>
+    <p:sldId id="389" r:id="rId27"/>
+    <p:sldId id="390" r:id="rId28"/>
+    <p:sldId id="391" r:id="rId29"/>
+    <p:sldId id="388" r:id="rId30"/>
+    <p:sldId id="345" r:id="rId31"/>
+    <p:sldId id="262" r:id="rId32"/>
   </p:sldIdLst>
   <p:sldSz cx="12192000" cy="6858000"/>
   <p:notesSz cx="6858000" cy="9144000"/>
@@ -225,7 +227,7 @@
           <a:p>
             <a:fld id="{B065A488-1AC6-B649-A88A-91D0E808665E}" type="datetimeFigureOut">
               <a:rPr lang="en-US" smtClean="0"/>
-              <a:t>2/25/19</a:t>
+              <a:t>2/26/19</a:t>
             </a:fld>
             <a:endParaRPr lang="en-US" dirty="0"/>
           </a:p>
@@ -2136,7 +2138,7 @@
           <a:p>
             <a:fld id="{48A87A34-81AB-432B-8DAE-1953F412C126}" type="datetimeFigureOut">
               <a:rPr lang="en-US" smtClean="0"/>
-              <a:t>2/25/19</a:t>
+              <a:t>2/26/19</a:t>
             </a:fld>
             <a:endParaRPr lang="en-US" dirty="0"/>
           </a:p>
@@ -2394,7 +2396,7 @@
           <a:p>
             <a:fld id="{48A87A34-81AB-432B-8DAE-1953F412C126}" type="datetimeFigureOut">
               <a:rPr lang="en-US" smtClean="0"/>
-              <a:t>2/25/19</a:t>
+              <a:t>2/26/19</a:t>
             </a:fld>
             <a:endParaRPr lang="en-US" dirty="0"/>
           </a:p>
@@ -2560,7 +2562,7 @@
           <a:p>
             <a:fld id="{48A87A34-81AB-432B-8DAE-1953F412C126}" type="datetimeFigureOut">
               <a:rPr lang="en-US" smtClean="0"/>
-              <a:t>2/25/19</a:t>
+              <a:t>2/26/19</a:t>
             </a:fld>
             <a:endParaRPr lang="en-US" dirty="0"/>
           </a:p>
@@ -2737,7 +2739,7 @@
             <a:fld id="{48A87A34-81AB-432B-8DAE-1953F412C126}" type="datetimeFigureOut">
               <a:rPr lang="en-US" smtClean="0"/>
               <a:pPr/>
-              <a:t>2/25/19</a:t>
+              <a:t>2/26/19</a:t>
             </a:fld>
             <a:endParaRPr lang="en-US" dirty="0"/>
           </a:p>
@@ -2991,7 +2993,7 @@
             <a:fld id="{48A87A34-81AB-432B-8DAE-1953F412C126}" type="datetimeFigureOut">
               <a:rPr lang="en-US" smtClean="0"/>
               <a:pPr/>
-              <a:t>2/25/19</a:t>
+              <a:t>2/26/19</a:t>
             </a:fld>
             <a:endParaRPr lang="en-US" dirty="0"/>
           </a:p>
@@ -3675,7 +3677,7 @@
           <a:p>
             <a:fld id="{48A87A34-81AB-432B-8DAE-1953F412C126}" type="datetimeFigureOut">
               <a:rPr lang="en-US" smtClean="0"/>
-              <a:t>2/25/19</a:t>
+              <a:t>2/26/19</a:t>
             </a:fld>
             <a:endParaRPr lang="en-US" dirty="0"/>
           </a:p>
@@ -3919,7 +3921,7 @@
             <a:fld id="{48A87A34-81AB-432B-8DAE-1953F412C126}" type="datetimeFigureOut">
               <a:rPr lang="en-US" smtClean="0"/>
               <a:pPr/>
-              <a:t>2/25/19</a:t>
+              <a:t>2/26/19</a:t>
             </a:fld>
             <a:endParaRPr lang="en-US" dirty="0"/>
           </a:p>
@@ -4163,7 +4165,7 @@
             <a:fld id="{48A87A34-81AB-432B-8DAE-1953F412C126}" type="datetimeFigureOut">
               <a:rPr lang="en-US" smtClean="0"/>
               <a:pPr/>
-              <a:t>2/25/19</a:t>
+              <a:t>2/26/19</a:t>
             </a:fld>
             <a:endParaRPr lang="en-US" dirty="0"/>
           </a:p>
@@ -4447,7 +4449,7 @@
           <a:p>
             <a:fld id="{48A87A34-81AB-432B-8DAE-1953F412C126}" type="datetimeFigureOut">
               <a:rPr lang="en-US" smtClean="0"/>
-              <a:t>2/25/19</a:t>
+              <a:t>2/26/19</a:t>
             </a:fld>
             <a:endParaRPr lang="en-US" dirty="0"/>
           </a:p>
@@ -4931,7 +4933,7 @@
           <a:p>
             <a:fld id="{48A87A34-81AB-432B-8DAE-1953F412C126}" type="datetimeFigureOut">
               <a:rPr lang="en-US" smtClean="0"/>
-              <a:t>2/25/19</a:t>
+              <a:t>2/26/19</a:t>
             </a:fld>
             <a:endParaRPr lang="en-US" dirty="0"/>
           </a:p>
@@ -5067,7 +5069,7 @@
           <a:p>
             <a:fld id="{48A87A34-81AB-432B-8DAE-1953F412C126}" type="datetimeFigureOut">
               <a:rPr lang="en-US" smtClean="0"/>
-              <a:t>2/25/19</a:t>
+              <a:t>2/26/19</a:t>
             </a:fld>
             <a:endParaRPr lang="en-US" dirty="0"/>
           </a:p>
@@ -5158,7 +5160,7 @@
           <a:p>
             <a:fld id="{48A87A34-81AB-432B-8DAE-1953F412C126}" type="datetimeFigureOut">
               <a:rPr lang="en-US" smtClean="0"/>
-              <a:t>2/25/19</a:t>
+              <a:t>2/26/19</a:t>
             </a:fld>
             <a:endParaRPr lang="en-US" dirty="0"/>
           </a:p>
@@ -5436,7 +5438,7 @@
           <a:p>
             <a:fld id="{48A87A34-81AB-432B-8DAE-1953F412C126}" type="datetimeFigureOut">
               <a:rPr lang="en-US" smtClean="0"/>
-              <a:t>2/25/19</a:t>
+              <a:t>2/26/19</a:t>
             </a:fld>
             <a:endParaRPr lang="en-US" dirty="0"/>
           </a:p>
@@ -5660,7 +5662,7 @@
             <a:fld id="{48A87A34-81AB-432B-8DAE-1953F412C126}" type="datetimeFigureOut">
               <a:rPr lang="en-US" smtClean="0"/>
               <a:pPr/>
-              <a:t>2/25/19</a:t>
+              <a:t>2/26/19</a:t>
             </a:fld>
             <a:endParaRPr lang="en-US" dirty="0"/>
           </a:p>
@@ -6105,15 +6107,7 @@
           <a:p>
             <a:r>
               <a:rPr lang="en-US" dirty="0" smtClean="0"/>
-              <a:t>Lesson 5: </a:t>
-            </a:r>
-            <a:r>
-              <a:rPr lang="en-US" dirty="0" smtClean="0"/>
-              <a:t>27 </a:t>
-            </a:r>
-            <a:r>
-              <a:rPr lang="en-US" dirty="0" smtClean="0"/>
-              <a:t>February 2019</a:t>
+              <a:t>Lesson 5: 27 February 2019</a:t>
             </a:r>
             <a:endParaRPr lang="en-US" dirty="0"/>
           </a:p>
@@ -6260,15 +6254,7 @@
           <a:p>
             <a:r>
               <a:rPr lang="en-US" dirty="0" smtClean="0"/>
-              <a:t>What </a:t>
-            </a:r>
-            <a:r>
-              <a:rPr lang="en-US" dirty="0" smtClean="0"/>
-              <a:t>we have </a:t>
-            </a:r>
-            <a:r>
-              <a:rPr lang="en-US" dirty="0" smtClean="0"/>
-              <a:t>learned in Python</a:t>
+              <a:t>What we have learned in Python</a:t>
             </a:r>
             <a:endParaRPr lang="en-US" dirty="0"/>
           </a:p>
@@ -6315,7 +6301,6 @@
               <a:rPr lang="en-US" dirty="0" smtClean="0"/>
               <a:t>Identifiers and Keywords</a:t>
             </a:r>
-            <a:endParaRPr lang="en-US" dirty="0" smtClean="0"/>
           </a:p>
           <a:p>
             <a:pPr lvl="1"/>
@@ -6330,7 +6315,6 @@
               <a:rPr lang="en-US" dirty="0" smtClean="0"/>
               <a:t>Assignment statement</a:t>
             </a:r>
-            <a:endParaRPr lang="en-US" dirty="0" smtClean="0"/>
           </a:p>
           <a:p>
             <a:pPr lvl="1"/>
@@ -6345,7 +6329,6 @@
               <a:rPr lang="en-US" dirty="0" smtClean="0"/>
               <a:t>Conditionals</a:t>
             </a:r>
-            <a:endParaRPr lang="en-US" dirty="0" smtClean="0"/>
           </a:p>
           <a:p>
             <a:pPr lvl="1"/>
@@ -7852,11 +7835,7 @@
             <a:pPr lvl="1"/>
             <a:r>
               <a:rPr lang="en-US" dirty="0" smtClean="0"/>
-              <a:t>Example Project: </a:t>
-            </a:r>
-            <a:r>
-              <a:rPr lang="en-US" dirty="0" smtClean="0"/>
-              <a:t>Building Ice Houses</a:t>
+              <a:t>Example Project: Building Ice Houses</a:t>
             </a:r>
             <a:endParaRPr lang="en-US" dirty="0"/>
           </a:p>
@@ -7904,6 +7883,154 @@
       </p:grpSpPr>
       <p:sp>
         <p:nvSpPr>
+          <p:cNvPr id="2" name="Title 1"/>
+          <p:cNvSpPr>
+            <a:spLocks noGrp="1"/>
+          </p:cNvSpPr>
+          <p:nvPr>
+            <p:ph type="title"/>
+          </p:nvPr>
+        </p:nvSpPr>
+        <p:spPr/>
+        <p:txBody>
+          <a:bodyPr/>
+          <a:lstStyle/>
+          <a:p>
+            <a:r>
+              <a:rPr lang="en-US" dirty="0" smtClean="0"/>
+              <a:t>Loops: the for loop</a:t>
+            </a:r>
+            <a:endParaRPr lang="en-US" dirty="0"/>
+          </a:p>
+        </p:txBody>
+      </p:sp>
+      <p:sp>
+        <p:nvSpPr>
+          <p:cNvPr id="3" name="Content Placeholder 2"/>
+          <p:cNvSpPr>
+            <a:spLocks noGrp="1"/>
+          </p:cNvSpPr>
+          <p:nvPr>
+            <p:ph idx="1"/>
+          </p:nvPr>
+        </p:nvSpPr>
+        <p:spPr/>
+        <p:txBody>
+          <a:bodyPr>
+            <a:normAutofit fontScale="77500" lnSpcReduction="20000"/>
+          </a:bodyPr>
+          <a:lstStyle/>
+          <a:p>
+            <a:r>
+              <a:rPr lang="en-US" dirty="0" smtClean="0"/>
+              <a:t>Sometimes we need to do something in a program more than once. </a:t>
+            </a:r>
+          </a:p>
+          <a:p>
+            <a:r>
+              <a:rPr lang="en-US" dirty="0" smtClean="0"/>
+              <a:t>We may need to execute a set of statements several times.</a:t>
+            </a:r>
+          </a:p>
+          <a:p>
+            <a:r>
+              <a:rPr lang="en-US" dirty="0" smtClean="0"/>
+              <a:t>A common example is executing a code block a specific number of times.</a:t>
+            </a:r>
+          </a:p>
+          <a:p>
+            <a:r>
+              <a:rPr lang="en-US" dirty="0" smtClean="0"/>
+              <a:t>We have the “for” loop for executing a “for each value in” statement.</a:t>
+            </a:r>
+          </a:p>
+          <a:p>
+            <a:r>
+              <a:rPr lang="en-US" dirty="0" smtClean="0"/>
+              <a:t>Example: suppose we want to execute a code block 10 times.</a:t>
+            </a:r>
+          </a:p>
+          <a:p>
+            <a:r>
+              <a:rPr lang="en-US" dirty="0" smtClean="0"/>
+              <a:t>The for loop goes like this:</a:t>
+            </a:r>
+          </a:p>
+          <a:p>
+            <a:pPr marL="0" indent="0">
+              <a:buNone/>
+            </a:pPr>
+            <a:r>
+              <a:rPr lang="en-US" b="1" dirty="0" smtClean="0">
+                <a:latin typeface="Courier New" charset="0"/>
+                <a:ea typeface="Courier New" charset="0"/>
+                <a:cs typeface="Courier New" charset="0"/>
+              </a:rPr>
+              <a:t>for &lt;variable&gt; in range(&lt;start&gt;, &lt;end&gt;):</a:t>
+            </a:r>
+          </a:p>
+          <a:p>
+            <a:pPr marL="0" indent="0">
+              <a:buNone/>
+            </a:pPr>
+            <a:r>
+              <a:rPr lang="en-US" b="1" dirty="0">
+                <a:latin typeface="Courier New" charset="0"/>
+                <a:ea typeface="Courier New" charset="0"/>
+                <a:cs typeface="Courier New" charset="0"/>
+              </a:rPr>
+              <a:t> </a:t>
+            </a:r>
+            <a:r>
+              <a:rPr lang="en-US" b="1" dirty="0" smtClean="0">
+                <a:latin typeface="Courier New" charset="0"/>
+                <a:ea typeface="Courier New" charset="0"/>
+                <a:cs typeface="Courier New" charset="0"/>
+              </a:rPr>
+              <a:t>   &lt;code to execute&gt;</a:t>
+            </a:r>
+          </a:p>
+          <a:p>
+            <a:r>
+              <a:rPr lang="en-US" dirty="0" smtClean="0"/>
+              <a:t>Note: the range() function end is exclusive. So, if we want to do something 10 times, using (1, 10) won’t work. Why?</a:t>
+            </a:r>
+            <a:endParaRPr lang="en-US" dirty="0"/>
+          </a:p>
+        </p:txBody>
+      </p:sp>
+    </p:spTree>
+    <p:extLst>
+      <p:ext uri="{BB962C8B-B14F-4D97-AF65-F5344CB8AC3E}">
+        <p14:creationId xmlns:p14="http://schemas.microsoft.com/office/powerpoint/2010/main" val="1742789170"/>
+      </p:ext>
+    </p:extLst>
+  </p:cSld>
+  <p:clrMapOvr>
+    <a:masterClrMapping/>
+  </p:clrMapOvr>
+</p:sld>
+</file>
+
+<file path=ppt/slides/slide21.xml><?xml version="1.0" encoding="utf-8"?>
+<p:sld xmlns:a="http://schemas.openxmlformats.org/drawingml/2006/main" xmlns:r="http://schemas.openxmlformats.org/officeDocument/2006/relationships" xmlns:p="http://schemas.openxmlformats.org/presentationml/2006/main">
+  <p:cSld>
+    <p:spTree>
+      <p:nvGrpSpPr>
+        <p:cNvPr id="1" name=""/>
+        <p:cNvGrpSpPr/>
+        <p:nvPr/>
+      </p:nvGrpSpPr>
+      <p:grpSpPr>
+        <a:xfrm>
+          <a:off x="0" y="0"/>
+          <a:ext cx="0" cy="0"/>
+          <a:chOff x="0" y="0"/>
+          <a:chExt cx="0" cy="0"/>
+        </a:xfrm>
+      </p:grpSpPr>
+      <p:sp>
+        <p:nvSpPr>
           <p:cNvPr id="4" name="Title 3"/>
           <p:cNvSpPr>
             <a:spLocks noGrp="1"/>
@@ -7964,89 +8091,6 @@
 </p:sld>
 </file>
 
-<file path=ppt/slides/slide21.xml><?xml version="1.0" encoding="utf-8"?>
-<p:sld xmlns:a="http://schemas.openxmlformats.org/drawingml/2006/main" xmlns:r="http://schemas.openxmlformats.org/officeDocument/2006/relationships" xmlns:p="http://schemas.openxmlformats.org/presentationml/2006/main">
-  <p:cSld>
-    <p:spTree>
-      <p:nvGrpSpPr>
-        <p:cNvPr id="1" name=""/>
-        <p:cNvGrpSpPr/>
-        <p:nvPr/>
-      </p:nvGrpSpPr>
-      <p:grpSpPr>
-        <a:xfrm>
-          <a:off x="0" y="0"/>
-          <a:ext cx="0" cy="0"/>
-          <a:chOff x="0" y="0"/>
-          <a:chExt cx="0" cy="0"/>
-        </a:xfrm>
-      </p:grpSpPr>
-      <p:sp>
-        <p:nvSpPr>
-          <p:cNvPr id="4" name="Title 3"/>
-          <p:cNvSpPr>
-            <a:spLocks noGrp="1"/>
-          </p:cNvSpPr>
-          <p:nvPr>
-            <p:ph type="title"/>
-          </p:nvPr>
-        </p:nvSpPr>
-        <p:spPr/>
-        <p:txBody>
-          <a:bodyPr/>
-          <a:lstStyle/>
-          <a:p>
-            <a:r>
-              <a:rPr lang="en-US" dirty="0" smtClean="0"/>
-              <a:t>Making an Ice House</a:t>
-            </a:r>
-            <a:endParaRPr lang="en-US" dirty="0"/>
-          </a:p>
-        </p:txBody>
-      </p:sp>
-      <p:sp>
-        <p:nvSpPr>
-          <p:cNvPr id="5" name="Content Placeholder 4"/>
-          <p:cNvSpPr>
-            <a:spLocks noGrp="1"/>
-          </p:cNvSpPr>
-          <p:nvPr>
-            <p:ph idx="1"/>
-          </p:nvPr>
-        </p:nvSpPr>
-        <p:spPr/>
-        <p:txBody>
-          <a:bodyPr>
-            <a:normAutofit fontScale="92500"/>
-          </a:bodyPr>
-          <a:lstStyle/>
-          <a:p>
-            <a:r>
-              <a:rPr lang="en-US" dirty="0" smtClean="0"/>
-              <a:t>Now that we know we can set any block to ice, wouldn’t it be nice to be able to build things by programming them into existence?</a:t>
-            </a:r>
-          </a:p>
-          <a:p>
-            <a:r>
-              <a:rPr lang="en-US" dirty="0"/>
-              <a:t>When you want to create lots of blocks you can use the function setBlocks() which, when passed two positions, will fill the gap in between with any block you want. The quickest and easiest way to create buildings in Minecraft is by creating a cube and then hollowing it out by creating a cube of air in the middle.</a:t>
-            </a:r>
-          </a:p>
-        </p:txBody>
-      </p:sp>
-    </p:spTree>
-    <p:extLst>
-      <p:ext uri="{BB962C8B-B14F-4D97-AF65-F5344CB8AC3E}">
-        <p14:creationId xmlns:p14="http://schemas.microsoft.com/office/powerpoint/2010/main" val="1128654317"/>
-      </p:ext>
-    </p:extLst>
-  </p:cSld>
-  <p:clrMapOvr>
-    <a:masterClrMapping/>
-  </p:clrMapOvr>
-</p:sld>
-</file>
-
 <file path=ppt/slides/slide22.xml><?xml version="1.0" encoding="utf-8"?>
 <p:sld xmlns:a="http://schemas.openxmlformats.org/drawingml/2006/main" xmlns:r="http://schemas.openxmlformats.org/officeDocument/2006/relationships" xmlns:p="http://schemas.openxmlformats.org/presentationml/2006/main">
   <p:cSld>
@@ -8081,7 +8125,11 @@
           <a:p>
             <a:r>
               <a:rPr lang="en-US" dirty="0" smtClean="0"/>
-              <a:t>Building an Ice  House</a:t>
+              <a:t>But first, let’s review</a:t>
+            </a:r>
+            <a:r>
+              <a:rPr lang="mr-IN" dirty="0" smtClean="0"/>
+              <a:t>…</a:t>
             </a:r>
             <a:endParaRPr lang="en-US" dirty="0"/>
           </a:p>
@@ -8100,86 +8148,47 @@
         <p:spPr/>
         <p:txBody>
           <a:bodyPr>
-            <a:normAutofit fontScale="55000" lnSpcReduction="20000"/>
+            <a:normAutofit/>
           </a:bodyPr>
           <a:lstStyle/>
           <a:p>
             <a:r>
               <a:rPr lang="en-US" dirty="0"/>
-              <a:t>Open IDLE by clicking Menu &gt; Programming &gt; Python </a:t>
-            </a:r>
-            <a:r>
-              <a:rPr lang="en-US" dirty="0" smtClean="0"/>
-              <a:t>3. </a:t>
-            </a:r>
-          </a:p>
-          <a:p>
-            <a:r>
-              <a:rPr lang="en-US" dirty="0" smtClean="0"/>
-              <a:t>Use </a:t>
-            </a:r>
-            <a:r>
-              <a:rPr lang="en-US" dirty="0"/>
-              <a:t>File &gt; New Window to create a new program and save it </a:t>
-            </a:r>
-            <a:r>
-              <a:rPr lang="en-US" dirty="0" smtClean="0"/>
-              <a:t>as </a:t>
-            </a:r>
-            <a:r>
-              <a:rPr lang="en-US" dirty="0" smtClean="0">
-                <a:latin typeface="Courier New" charset="0"/>
-                <a:ea typeface="Courier New" charset="0"/>
-                <a:cs typeface="Courier New" charset="0"/>
-              </a:rPr>
-              <a:t>icehouse1.py</a:t>
-            </a:r>
-            <a:r>
-              <a:rPr lang="en-US" dirty="0" smtClean="0"/>
-              <a:t>.</a:t>
-            </a:r>
-          </a:p>
-          <a:p>
-            <a:r>
-              <a:rPr lang="en-US" dirty="0" smtClean="0"/>
-              <a:t>Import </a:t>
-            </a:r>
-            <a:r>
-              <a:rPr lang="en-US" dirty="0"/>
-              <a:t>the minecraft and block </a:t>
-            </a:r>
-            <a:r>
-              <a:rPr lang="en-US" dirty="0" smtClean="0"/>
-              <a:t>modules.</a:t>
-            </a:r>
+              <a:t>File: </a:t>
+            </a:r>
+            <a:r>
+              <a:rPr lang="en-US" dirty="0" smtClean="0"/>
+              <a:t>iceman2.py</a:t>
+            </a:r>
+            <a:endParaRPr lang="en-US" dirty="0"/>
           </a:p>
           <a:p>
             <a:pPr marL="0" indent="0">
               <a:buNone/>
             </a:pPr>
             <a:r>
-              <a:rPr lang="en-US" sz="3600" dirty="0" smtClean="0">
-                <a:latin typeface="Courier New" charset="0"/>
-                <a:ea typeface="Courier New" charset="0"/>
-                <a:cs typeface="Courier New" charset="0"/>
-              </a:rPr>
-              <a:t>import </a:t>
-            </a:r>
-            <a:r>
-              <a:rPr lang="en-US" sz="3600" dirty="0">
-                <a:latin typeface="Courier New" charset="0"/>
-                <a:ea typeface="Courier New" charset="0"/>
-                <a:cs typeface="Courier New" charset="0"/>
-              </a:rPr>
-              <a:t>mcpi.minecraft as </a:t>
-            </a:r>
-            <a:r>
-              <a:rPr lang="en-US" sz="3600" dirty="0" smtClean="0">
-                <a:latin typeface="Courier New" charset="0"/>
-                <a:ea typeface="Courier New" charset="0"/>
-                <a:cs typeface="Courier New" charset="0"/>
-              </a:rPr>
-              <a:t>minecraft</a:t>
+              <a:rPr lang="en-US" sz="2200" dirty="0">
+                <a:latin typeface="Courier New" charset="0"/>
+                <a:ea typeface="Courier New" charset="0"/>
+                <a:cs typeface="Courier New" charset="0"/>
+              </a:rPr>
+              <a:t># iceman2.py – Set every tile Steve </a:t>
+            </a:r>
+            <a:r>
+              <a:rPr lang="en-US" sz="2200" dirty="0" smtClean="0">
+                <a:latin typeface="Courier New" charset="0"/>
+                <a:ea typeface="Courier New" charset="0"/>
+                <a:cs typeface="Courier New" charset="0"/>
+              </a:rPr>
+              <a:t>hits to </a:t>
+            </a:r>
+            <a:r>
+              <a:rPr lang="en-US" sz="2200" dirty="0">
+                <a:latin typeface="Courier New" charset="0"/>
+                <a:ea typeface="Courier New" charset="0"/>
+                <a:cs typeface="Courier New" charset="0"/>
+              </a:rPr>
+              <a:t>ice.</a:t>
             </a:r>
           </a:p>
           <a:p>
@@ -8187,42 +8196,28 @@
               <a:buNone/>
             </a:pPr>
             <a:r>
-              <a:rPr lang="en-US" sz="3600" dirty="0" smtClean="0">
-                <a:latin typeface="Courier New" charset="0"/>
-                <a:ea typeface="Courier New" charset="0"/>
-                <a:cs typeface="Courier New" charset="0"/>
-              </a:rPr>
-              <a:t>import </a:t>
-            </a:r>
-            <a:r>
-              <a:rPr lang="en-US" sz="3600" dirty="0">
-                <a:latin typeface="Courier New" charset="0"/>
-                <a:ea typeface="Courier New" charset="0"/>
-                <a:cs typeface="Courier New" charset="0"/>
-              </a:rPr>
-              <a:t>mcpi.block as </a:t>
-            </a:r>
-            <a:r>
-              <a:rPr lang="en-US" sz="3600" dirty="0" smtClean="0">
-                <a:latin typeface="Courier New" charset="0"/>
-                <a:ea typeface="Courier New" charset="0"/>
-                <a:cs typeface="Courier New" charset="0"/>
-              </a:rPr>
-              <a:t>block</a:t>
-            </a:r>
-          </a:p>
-          <a:p>
-            <a:r>
-              <a:rPr lang="en-US" dirty="0" smtClean="0"/>
-              <a:t>Create </a:t>
-            </a:r>
-            <a:r>
-              <a:rPr lang="en-US" dirty="0"/>
-              <a:t>a connection from your program to Minecraft and call it mc</a:t>
-            </a:r>
-            <a:r>
-              <a:rPr lang="en-US" dirty="0" smtClean="0"/>
-              <a:t>.</a:t>
+              <a:rPr lang="en-US" sz="2200" dirty="0">
+                <a:latin typeface="Courier New" charset="0"/>
+                <a:ea typeface="Courier New" charset="0"/>
+                <a:cs typeface="Courier New" charset="0"/>
+              </a:rPr>
+              <a:t>from </a:t>
+            </a:r>
+            <a:r>
+              <a:rPr lang="en-US" sz="2200" dirty="0" err="1">
+                <a:latin typeface="Courier New" charset="0"/>
+                <a:ea typeface="Courier New" charset="0"/>
+                <a:cs typeface="Courier New" charset="0"/>
+              </a:rPr>
+              <a:t>mcpi.minecraft</a:t>
+            </a:r>
+            <a:r>
+              <a:rPr lang="en-US" sz="2200" dirty="0">
+                <a:latin typeface="Courier New" charset="0"/>
+                <a:ea typeface="Courier New" charset="0"/>
+                <a:cs typeface="Courier New" charset="0"/>
+              </a:rPr>
+              <a:t> import Minecraft </a:t>
             </a:r>
           </a:p>
           <a:p>
@@ -8230,265 +8225,356 @@
               <a:buNone/>
             </a:pPr>
             <a:r>
-              <a:rPr lang="en-US" sz="3600" dirty="0" smtClean="0">
-                <a:latin typeface="Courier New" charset="0"/>
-                <a:ea typeface="Courier New" charset="0"/>
-                <a:cs typeface="Courier New" charset="0"/>
-              </a:rPr>
-              <a:t>mc </a:t>
-            </a:r>
-            <a:r>
-              <a:rPr lang="en-US" sz="3600" dirty="0">
-                <a:latin typeface="Courier New" charset="0"/>
-                <a:ea typeface="Courier New" charset="0"/>
-                <a:cs typeface="Courier New" charset="0"/>
-              </a:rPr>
-              <a:t>= minecraft.Minecraft.create</a:t>
-            </a:r>
-            <a:r>
-              <a:rPr lang="en-US" sz="3600" dirty="0" smtClean="0">
+              <a:rPr lang="en-US" sz="2200" dirty="0">
+                <a:latin typeface="Courier New" charset="0"/>
+                <a:ea typeface="Courier New" charset="0"/>
+                <a:cs typeface="Courier New" charset="0"/>
+              </a:rPr>
+              <a:t>from </a:t>
+            </a:r>
+            <a:r>
+              <a:rPr lang="en-US" sz="2200" dirty="0" err="1">
+                <a:latin typeface="Courier New" charset="0"/>
+                <a:ea typeface="Courier New" charset="0"/>
+                <a:cs typeface="Courier New" charset="0"/>
+              </a:rPr>
+              <a:t>mcpi</a:t>
+            </a:r>
+            <a:r>
+              <a:rPr lang="en-US" sz="2200" dirty="0">
+                <a:latin typeface="Courier New" charset="0"/>
+                <a:ea typeface="Courier New" charset="0"/>
+                <a:cs typeface="Courier New" charset="0"/>
+              </a:rPr>
+              <a:t> import block</a:t>
+            </a:r>
+          </a:p>
+          <a:p>
+            <a:pPr marL="0" indent="0">
+              <a:buNone/>
+            </a:pPr>
+            <a:r>
+              <a:rPr lang="en-US" sz="2200" dirty="0">
+                <a:latin typeface="Courier New" charset="0"/>
+                <a:ea typeface="Courier New" charset="0"/>
+                <a:cs typeface="Courier New" charset="0"/>
+              </a:rPr>
+              <a:t>mc = </a:t>
+            </a:r>
+            <a:r>
+              <a:rPr lang="en-US" sz="2200" dirty="0" err="1">
+                <a:latin typeface="Courier New" charset="0"/>
+                <a:ea typeface="Courier New" charset="0"/>
+                <a:cs typeface="Courier New" charset="0"/>
+              </a:rPr>
+              <a:t>Minecraft.create</a:t>
+            </a:r>
+            <a:r>
+              <a:rPr lang="en-US" sz="2200" dirty="0">
                 <a:latin typeface="Courier New" charset="0"/>
                 <a:ea typeface="Courier New" charset="0"/>
                 <a:cs typeface="Courier New" charset="0"/>
               </a:rPr>
               <a:t>()</a:t>
             </a:r>
-            <a:endParaRPr lang="en-US" sz="3600" dirty="0">
+          </a:p>
+          <a:p>
+            <a:pPr marL="0" indent="0">
+              <a:buNone/>
+            </a:pPr>
+            <a:r>
+              <a:rPr lang="en-US" sz="2200" dirty="0">
+                <a:latin typeface="Courier New" charset="0"/>
+                <a:ea typeface="Courier New" charset="0"/>
+                <a:cs typeface="Courier New" charset="0"/>
+              </a:rPr>
+              <a:t>while True:</a:t>
+            </a:r>
+          </a:p>
+          <a:p>
+            <a:pPr marL="0" indent="0">
+              <a:buNone/>
+            </a:pPr>
+            <a:r>
+              <a:rPr lang="en-US" sz="2200" dirty="0">
+                <a:latin typeface="Courier New" charset="0"/>
+                <a:ea typeface="Courier New" charset="0"/>
+                <a:cs typeface="Courier New" charset="0"/>
+              </a:rPr>
+              <a:t>    </a:t>
+            </a:r>
+            <a:r>
+              <a:rPr lang="en-US" sz="2200" dirty="0" err="1">
+                <a:latin typeface="Courier New" charset="0"/>
+                <a:ea typeface="Courier New" charset="0"/>
+                <a:cs typeface="Courier New" charset="0"/>
+              </a:rPr>
+              <a:t>pos</a:t>
+            </a:r>
+            <a:r>
+              <a:rPr lang="en-US" sz="2200" dirty="0">
+                <a:latin typeface="Courier New" charset="0"/>
+                <a:ea typeface="Courier New" charset="0"/>
+                <a:cs typeface="Courier New" charset="0"/>
+              </a:rPr>
+              <a:t> = </a:t>
+            </a:r>
+            <a:r>
+              <a:rPr lang="en-US" sz="2200" dirty="0" err="1">
+                <a:latin typeface="Courier New" charset="0"/>
+                <a:ea typeface="Courier New" charset="0"/>
+                <a:cs typeface="Courier New" charset="0"/>
+              </a:rPr>
+              <a:t>mc.player.getTilePos</a:t>
+            </a:r>
+            <a:r>
+              <a:rPr lang="en-US" sz="2200" dirty="0">
+                <a:latin typeface="Courier New" charset="0"/>
+                <a:ea typeface="Courier New" charset="0"/>
+                <a:cs typeface="Courier New" charset="0"/>
+              </a:rPr>
+              <a:t>() </a:t>
+            </a:r>
+          </a:p>
+          <a:p>
+            <a:pPr marL="0" indent="0">
+              <a:buNone/>
+            </a:pPr>
+            <a:r>
+              <a:rPr lang="en-US" sz="2200" dirty="0">
+                <a:latin typeface="Courier New" charset="0"/>
+                <a:ea typeface="Courier New" charset="0"/>
+                <a:cs typeface="Courier New" charset="0"/>
+              </a:rPr>
+              <a:t>    </a:t>
+            </a:r>
+            <a:r>
+              <a:rPr lang="en-US" sz="2200" dirty="0" err="1">
+                <a:latin typeface="Courier New" charset="0"/>
+                <a:ea typeface="Courier New" charset="0"/>
+                <a:cs typeface="Courier New" charset="0"/>
+              </a:rPr>
+              <a:t>mc.setBlock</a:t>
+            </a:r>
+            <a:r>
+              <a:rPr lang="en-US" sz="2200" dirty="0">
+                <a:latin typeface="Courier New" charset="0"/>
+                <a:ea typeface="Courier New" charset="0"/>
+                <a:cs typeface="Courier New" charset="0"/>
+              </a:rPr>
+              <a:t>(</a:t>
+            </a:r>
+            <a:r>
+              <a:rPr lang="en-US" sz="2200" dirty="0" err="1">
+                <a:latin typeface="Courier New" charset="0"/>
+                <a:ea typeface="Courier New" charset="0"/>
+                <a:cs typeface="Courier New" charset="0"/>
+              </a:rPr>
+              <a:t>pos.x</a:t>
+            </a:r>
+            <a:r>
+              <a:rPr lang="en-US" sz="2200" dirty="0">
+                <a:latin typeface="Courier New" charset="0"/>
+                <a:ea typeface="Courier New" charset="0"/>
+                <a:cs typeface="Courier New" charset="0"/>
+              </a:rPr>
+              <a:t>, </a:t>
+            </a:r>
+            <a:r>
+              <a:rPr lang="en-US" sz="2200" dirty="0" err="1">
+                <a:latin typeface="Courier New" charset="0"/>
+                <a:ea typeface="Courier New" charset="0"/>
+                <a:cs typeface="Courier New" charset="0"/>
+              </a:rPr>
+              <a:t>pos.y</a:t>
+            </a:r>
+            <a:r>
+              <a:rPr lang="en-US" sz="2200" dirty="0">
+                <a:latin typeface="Courier New" charset="0"/>
+                <a:ea typeface="Courier New" charset="0"/>
+                <a:cs typeface="Courier New" charset="0"/>
+              </a:rPr>
+              <a:t>, </a:t>
+            </a:r>
+            <a:r>
+              <a:rPr lang="en-US" sz="2200" dirty="0" err="1">
+                <a:latin typeface="Courier New" charset="0"/>
+                <a:ea typeface="Courier New" charset="0"/>
+                <a:cs typeface="Courier New" charset="0"/>
+              </a:rPr>
+              <a:t>pos.z</a:t>
+            </a:r>
+            <a:r>
+              <a:rPr lang="en-US" sz="2200" dirty="0">
+                <a:latin typeface="Courier New" charset="0"/>
+                <a:ea typeface="Courier New" charset="0"/>
+                <a:cs typeface="Courier New" charset="0"/>
+              </a:rPr>
+              <a:t>, </a:t>
+            </a:r>
+            <a:r>
+              <a:rPr lang="en-US" sz="2200" dirty="0" err="1">
+                <a:latin typeface="Courier New" charset="0"/>
+                <a:ea typeface="Courier New" charset="0"/>
+                <a:cs typeface="Courier New" charset="0"/>
+              </a:rPr>
+              <a:t>block.SNOW</a:t>
+            </a:r>
+            <a:r>
+              <a:rPr lang="en-US" sz="2200" dirty="0">
+                <a:latin typeface="Courier New" charset="0"/>
+                <a:ea typeface="Courier New" charset="0"/>
+                <a:cs typeface="Courier New" charset="0"/>
+              </a:rPr>
+              <a:t>)</a:t>
+            </a:r>
+          </a:p>
+          <a:p>
+            <a:pPr marL="0" indent="0">
+              <a:buNone/>
+            </a:pPr>
+            <a:r>
+              <a:rPr lang="en-US" sz="2200" dirty="0">
+                <a:latin typeface="Courier New" charset="0"/>
+                <a:ea typeface="Courier New" charset="0"/>
+                <a:cs typeface="Courier New" charset="0"/>
+              </a:rPr>
+              <a:t>    for hit in </a:t>
+            </a:r>
+            <a:r>
+              <a:rPr lang="en-US" sz="2200" dirty="0" err="1">
+                <a:latin typeface="Courier New" charset="0"/>
+                <a:ea typeface="Courier New" charset="0"/>
+                <a:cs typeface="Courier New" charset="0"/>
+              </a:rPr>
+              <a:t>mc.events.pollBlockHits</a:t>
+            </a:r>
+            <a:r>
+              <a:rPr lang="en-US" sz="2200" dirty="0">
+                <a:latin typeface="Courier New" charset="0"/>
+                <a:ea typeface="Courier New" charset="0"/>
+                <a:cs typeface="Courier New" charset="0"/>
+              </a:rPr>
+              <a:t>():</a:t>
+            </a:r>
+          </a:p>
+          <a:p>
+            <a:pPr marL="0" indent="0">
+              <a:buNone/>
+            </a:pPr>
+            <a:r>
+              <a:rPr lang="en-US" sz="2200" dirty="0">
+                <a:latin typeface="Courier New" charset="0"/>
+                <a:ea typeface="Courier New" charset="0"/>
+                <a:cs typeface="Courier New" charset="0"/>
+              </a:rPr>
+              <a:t>        </a:t>
+            </a:r>
+            <a:r>
+              <a:rPr lang="en-US" sz="2200" dirty="0" err="1">
+                <a:latin typeface="Courier New" charset="0"/>
+                <a:ea typeface="Courier New" charset="0"/>
+                <a:cs typeface="Courier New" charset="0"/>
+              </a:rPr>
+              <a:t>mc.setBlock</a:t>
+            </a:r>
+            <a:r>
+              <a:rPr lang="en-US" sz="2200" dirty="0">
+                <a:latin typeface="Courier New" charset="0"/>
+                <a:ea typeface="Courier New" charset="0"/>
+                <a:cs typeface="Courier New" charset="0"/>
+              </a:rPr>
+              <a:t>(</a:t>
+            </a:r>
+            <a:r>
+              <a:rPr lang="en-US" sz="2200" dirty="0" err="1">
+                <a:latin typeface="Courier New" charset="0"/>
+                <a:ea typeface="Courier New" charset="0"/>
+                <a:cs typeface="Courier New" charset="0"/>
+              </a:rPr>
+              <a:t>hit.pos.x</a:t>
+            </a:r>
+            <a:r>
+              <a:rPr lang="en-US" sz="2200" dirty="0">
+                <a:latin typeface="Courier New" charset="0"/>
+                <a:ea typeface="Courier New" charset="0"/>
+                <a:cs typeface="Courier New" charset="0"/>
+              </a:rPr>
+              <a:t>, </a:t>
+            </a:r>
+            <a:r>
+              <a:rPr lang="en-US" sz="2200" dirty="0" err="1">
+                <a:latin typeface="Courier New" charset="0"/>
+                <a:ea typeface="Courier New" charset="0"/>
+                <a:cs typeface="Courier New" charset="0"/>
+              </a:rPr>
+              <a:t>hit.pos.y</a:t>
+            </a:r>
+            <a:r>
+              <a:rPr lang="en-US" sz="2200" dirty="0">
+                <a:latin typeface="Courier New" charset="0"/>
+                <a:ea typeface="Courier New" charset="0"/>
+                <a:cs typeface="Courier New" charset="0"/>
+              </a:rPr>
+              <a:t>,</a:t>
+            </a:r>
+          </a:p>
+          <a:p>
+            <a:pPr marL="0" indent="0">
+              <a:buNone/>
+            </a:pPr>
+            <a:r>
+              <a:rPr lang="en-US" sz="2200" dirty="0">
+                <a:latin typeface="Courier New" charset="0"/>
+                <a:ea typeface="Courier New" charset="0"/>
+                <a:cs typeface="Courier New" charset="0"/>
+              </a:rPr>
+              <a:t>                    </a:t>
+            </a:r>
+            <a:r>
+              <a:rPr lang="en-US" sz="2200" dirty="0" err="1">
+                <a:latin typeface="Courier New" charset="0"/>
+                <a:ea typeface="Courier New" charset="0"/>
+                <a:cs typeface="Courier New" charset="0"/>
+              </a:rPr>
+              <a:t>hit.pos.z</a:t>
+            </a:r>
+            <a:r>
+              <a:rPr lang="en-US" sz="2200" dirty="0">
+                <a:latin typeface="Courier New" charset="0"/>
+                <a:ea typeface="Courier New" charset="0"/>
+                <a:cs typeface="Courier New" charset="0"/>
+              </a:rPr>
+              <a:t>, </a:t>
+            </a:r>
+            <a:r>
+              <a:rPr lang="en-US" sz="2200" dirty="0" err="1">
+                <a:latin typeface="Courier New" charset="0"/>
+                <a:ea typeface="Courier New" charset="0"/>
+                <a:cs typeface="Courier New" charset="0"/>
+              </a:rPr>
+              <a:t>block.ICE</a:t>
+            </a:r>
+            <a:r>
+              <a:rPr lang="en-US" sz="2200" dirty="0" smtClean="0">
+                <a:latin typeface="Courier New" charset="0"/>
+                <a:ea typeface="Courier New" charset="0"/>
+                <a:cs typeface="Courier New" charset="0"/>
+              </a:rPr>
+              <a:t>)</a:t>
+            </a:r>
+            <a:endParaRPr lang="en-US" sz="2200" dirty="0">
               <a:latin typeface="Courier New" charset="0"/>
               <a:ea typeface="Courier New" charset="0"/>
               <a:cs typeface="Courier New" charset="0"/>
             </a:endParaRPr>
           </a:p>
-          <a:p>
-            <a:r>
-              <a:rPr lang="en-US" dirty="0" smtClean="0"/>
-              <a:t>Get </a:t>
-            </a:r>
-            <a:r>
-              <a:rPr lang="en-US" dirty="0"/>
-              <a:t>the player’s </a:t>
-            </a:r>
-            <a:r>
-              <a:rPr lang="en-US" dirty="0" smtClean="0"/>
-              <a:t>position.</a:t>
-            </a:r>
-          </a:p>
-          <a:p>
-            <a:pPr marL="0" indent="0">
-              <a:buNone/>
-            </a:pPr>
-            <a:r>
-              <a:rPr lang="en-US" sz="3600" dirty="0" smtClean="0">
-                <a:latin typeface="Courier New" charset="0"/>
-                <a:ea typeface="Courier New" charset="0"/>
-                <a:cs typeface="Courier New" charset="0"/>
-              </a:rPr>
-              <a:t>p </a:t>
-            </a:r>
-            <a:r>
-              <a:rPr lang="en-US" sz="3600" dirty="0">
-                <a:latin typeface="Courier New" charset="0"/>
-                <a:ea typeface="Courier New" charset="0"/>
-                <a:cs typeface="Courier New" charset="0"/>
-              </a:rPr>
-              <a:t>= mc.player.getTilePos</a:t>
-            </a:r>
-            <a:r>
-              <a:rPr lang="en-US" sz="3600" dirty="0" smtClean="0">
-                <a:latin typeface="Courier New" charset="0"/>
-                <a:ea typeface="Courier New" charset="0"/>
-                <a:cs typeface="Courier New" charset="0"/>
-              </a:rPr>
-              <a:t>()</a:t>
-            </a:r>
-            <a:endParaRPr lang="en-US" sz="3600" dirty="0">
-              <a:latin typeface="Courier New" charset="0"/>
-              <a:ea typeface="Courier New" charset="0"/>
-              <a:cs typeface="Courier New" charset="0"/>
-            </a:endParaRPr>
-          </a:p>
-          <a:p>
-            <a:r>
-              <a:rPr lang="en-US" dirty="0" smtClean="0"/>
-              <a:t>Use </a:t>
-            </a:r>
-            <a:r>
-              <a:rPr lang="en-US" dirty="0"/>
-              <a:t>the setBlocks() function to create a cube of ice next to </a:t>
-            </a:r>
-            <a:r>
-              <a:rPr lang="en-US" dirty="0" smtClean="0"/>
-              <a:t>Steve of </a:t>
-            </a:r>
-            <a:r>
-              <a:rPr lang="en-US" dirty="0"/>
-              <a:t>size 11 x 5 x </a:t>
-            </a:r>
-            <a:r>
-              <a:rPr lang="en-US" dirty="0" smtClean="0"/>
-              <a:t>11.</a:t>
-            </a:r>
-          </a:p>
-          <a:p>
-            <a:pPr marL="0" indent="0">
-              <a:buNone/>
-            </a:pPr>
-            <a:r>
-              <a:rPr lang="en-US" sz="3600" dirty="0" smtClean="0">
-                <a:latin typeface="Courier New" charset="0"/>
-                <a:ea typeface="Courier New" charset="0"/>
-                <a:cs typeface="Courier New" charset="0"/>
-              </a:rPr>
-              <a:t>mc.setBlocks(p.x </a:t>
-            </a:r>
-            <a:r>
-              <a:rPr lang="en-US" sz="3600" dirty="0">
-                <a:latin typeface="Courier New" charset="0"/>
-                <a:ea typeface="Courier New" charset="0"/>
-                <a:cs typeface="Courier New" charset="0"/>
-              </a:rPr>
-              <a:t>+ 1, p.y, p.z + 1, </a:t>
-            </a:r>
-            <a:endParaRPr lang="en-US" sz="3600" dirty="0" smtClean="0">
-              <a:latin typeface="Courier New" charset="0"/>
-              <a:ea typeface="Courier New" charset="0"/>
-              <a:cs typeface="Courier New" charset="0"/>
-            </a:endParaRPr>
-          </a:p>
-          <a:p>
-            <a:pPr marL="0" indent="0">
-              <a:buNone/>
-            </a:pPr>
-            <a:r>
-              <a:rPr lang="en-US" sz="3600" dirty="0">
-                <a:latin typeface="Courier New" charset="0"/>
-                <a:ea typeface="Courier New" charset="0"/>
-                <a:cs typeface="Courier New" charset="0"/>
-              </a:rPr>
-              <a:t> </a:t>
-            </a:r>
-            <a:r>
-              <a:rPr lang="en-US" sz="3600" dirty="0" smtClean="0">
-                <a:latin typeface="Courier New" charset="0"/>
-                <a:ea typeface="Courier New" charset="0"/>
-                <a:cs typeface="Courier New" charset="0"/>
-              </a:rPr>
-              <a:t>            p.x </a:t>
-            </a:r>
-            <a:r>
-              <a:rPr lang="en-US" sz="3600" dirty="0">
-                <a:latin typeface="Courier New" charset="0"/>
-                <a:ea typeface="Courier New" charset="0"/>
-                <a:cs typeface="Courier New" charset="0"/>
-              </a:rPr>
-              <a:t>+ 10, p.y + 5, p.z + </a:t>
-            </a:r>
-            <a:r>
-              <a:rPr lang="en-US" sz="3600" dirty="0" smtClean="0">
-                <a:latin typeface="Courier New" charset="0"/>
-                <a:ea typeface="Courier New" charset="0"/>
-                <a:cs typeface="Courier New" charset="0"/>
-              </a:rPr>
-              <a:t>10,block.ICE)</a:t>
-            </a:r>
-          </a:p>
-          <a:p>
-            <a:r>
-              <a:rPr lang="en-US" dirty="0" smtClean="0"/>
-              <a:t>Create </a:t>
-            </a:r>
-            <a:r>
-              <a:rPr lang="en-US" dirty="0"/>
-              <a:t>a cube of air inside the ice, making it hollow: </a:t>
-            </a:r>
-          </a:p>
-          <a:p>
-            <a:pPr marL="0" indent="0">
-              <a:buNone/>
-            </a:pPr>
-            <a:r>
-              <a:rPr lang="en-US" sz="3400" dirty="0" smtClean="0">
-                <a:latin typeface="Courier New" charset="0"/>
-                <a:ea typeface="Courier New" charset="0"/>
-                <a:cs typeface="Courier New" charset="0"/>
-              </a:rPr>
-              <a:t>mc.setBlocks(p.x </a:t>
-            </a:r>
-            <a:r>
-              <a:rPr lang="en-US" sz="3400" dirty="0">
-                <a:latin typeface="Courier New" charset="0"/>
-                <a:ea typeface="Courier New" charset="0"/>
-                <a:cs typeface="Courier New" charset="0"/>
-              </a:rPr>
-              <a:t>+ 2, p.y + 1, p.z + 2, </a:t>
-            </a:r>
-            <a:endParaRPr lang="en-US" sz="3400" dirty="0" smtClean="0">
-              <a:latin typeface="Courier New" charset="0"/>
-              <a:ea typeface="Courier New" charset="0"/>
-              <a:cs typeface="Courier New" charset="0"/>
-            </a:endParaRPr>
-          </a:p>
-          <a:p>
-            <a:pPr marL="0" indent="0">
-              <a:buNone/>
-            </a:pPr>
-            <a:r>
-              <a:rPr lang="en-US" sz="3400" dirty="0" smtClean="0">
-                <a:latin typeface="Courier New" charset="0"/>
-                <a:ea typeface="Courier New" charset="0"/>
-                <a:cs typeface="Courier New" charset="0"/>
-              </a:rPr>
-              <a:t>             p.x </a:t>
-            </a:r>
-            <a:r>
-              <a:rPr lang="en-US" sz="3400" dirty="0">
-                <a:latin typeface="Courier New" charset="0"/>
-                <a:ea typeface="Courier New" charset="0"/>
-                <a:cs typeface="Courier New" charset="0"/>
-              </a:rPr>
-              <a:t>+ 9, </a:t>
-            </a:r>
-            <a:r>
-              <a:rPr lang="en-US" sz="3400" dirty="0" smtClean="0">
-                <a:latin typeface="Courier New" charset="0"/>
-                <a:ea typeface="Courier New" charset="0"/>
-                <a:cs typeface="Courier New" charset="0"/>
-              </a:rPr>
-              <a:t>p.y </a:t>
-            </a:r>
-            <a:r>
-              <a:rPr lang="en-US" sz="3400" dirty="0">
-                <a:latin typeface="Courier New" charset="0"/>
-                <a:ea typeface="Courier New" charset="0"/>
-                <a:cs typeface="Courier New" charset="0"/>
-              </a:rPr>
-              <a:t>+ 4, p.z + </a:t>
-            </a:r>
-            <a:r>
-              <a:rPr lang="en-US" sz="3400" dirty="0" smtClean="0">
-                <a:latin typeface="Courier New" charset="0"/>
-                <a:ea typeface="Courier New" charset="0"/>
-                <a:cs typeface="Courier New" charset="0"/>
-              </a:rPr>
-              <a:t>9,block.AIR)</a:t>
-            </a:r>
-          </a:p>
-          <a:p>
-            <a:r>
-              <a:rPr lang="en-US" dirty="0" smtClean="0"/>
-              <a:t>Run </a:t>
-            </a:r>
-            <a:r>
-              <a:rPr lang="en-US" dirty="0"/>
-              <a:t>your program by clicking Run &gt; Run Module.</a:t>
-            </a:r>
-          </a:p>
         </p:txBody>
       </p:sp>
     </p:spTree>
     <p:extLst>
       <p:ext uri="{BB962C8B-B14F-4D97-AF65-F5344CB8AC3E}">
-        <p14:creationId xmlns:p14="http://schemas.microsoft.com/office/powerpoint/2010/main" val="104629221"/>
+        <p14:creationId xmlns:p14="http://schemas.microsoft.com/office/powerpoint/2010/main" val="234911673"/>
       </p:ext>
     </p:extLst>
   </p:cSld>
@@ -8517,7 +8603,7 @@
       </p:grpSpPr>
       <p:sp>
         <p:nvSpPr>
-          <p:cNvPr id="2" name="Title 1"/>
+          <p:cNvPr id="4" name="Title 3"/>
           <p:cNvSpPr>
             <a:spLocks noGrp="1"/>
           </p:cNvSpPr>
@@ -8532,7 +8618,7 @@
           <a:p>
             <a:r>
               <a:rPr lang="en-US" dirty="0" smtClean="0"/>
-              <a:t>Building an Ice House</a:t>
+              <a:t>Making an Ice House</a:t>
             </a:r>
             <a:endParaRPr lang="en-US" dirty="0"/>
           </a:p>
@@ -8540,7 +8626,7 @@
       </p:sp>
       <p:sp>
         <p:nvSpPr>
-          <p:cNvPr id="3" name="Content Placeholder 2"/>
+          <p:cNvPr id="5" name="Content Placeholder 4"/>
           <p:cNvSpPr>
             <a:spLocks noGrp="1"/>
           </p:cNvSpPr>
@@ -8550,41 +8636,28 @@
         </p:nvSpPr>
         <p:spPr/>
         <p:txBody>
-          <a:bodyPr/>
-          <a:lstStyle/>
+          <a:bodyPr>
+            <a:normAutofit fontScale="92500"/>
+          </a:bodyPr>
+          <a:lstStyle/>
+          <a:p>
+            <a:r>
+              <a:rPr lang="en-US" dirty="0" smtClean="0"/>
+              <a:t>Now that we know we can set any block to ice, wouldn’t it be nice to be able to build things by programming them into existence?</a:t>
+            </a:r>
+          </a:p>
           <a:p>
             <a:r>
               <a:rPr lang="en-US" dirty="0"/>
-              <a:t>A large cube of ice will appear next to Steve; if you break some of the ice blocks, you’ll see that it’s hollow and you can walk inside</a:t>
-            </a:r>
-            <a:r>
-              <a:rPr lang="en-US" dirty="0" smtClean="0"/>
-              <a:t>.</a:t>
-            </a:r>
-          </a:p>
-          <a:p>
-            <a:r>
-              <a:rPr lang="en-US" dirty="0" smtClean="0"/>
-              <a:t>The </a:t>
-            </a:r>
-            <a:r>
-              <a:rPr lang="en-US" dirty="0"/>
-              <a:t>ice house is still pretty basic and at the moment there’s no way to get in, so modify your program to create a door and put some carpet on the </a:t>
-            </a:r>
-            <a:r>
-              <a:rPr lang="en-US" dirty="0" smtClean="0"/>
-              <a:t>floor.</a:t>
-            </a:r>
-          </a:p>
-          <a:p>
-            <a:endParaRPr lang="en-US" dirty="0"/>
+              <a:t>When you want to create lots of blocks you can use the function setBlocks() which, when passed two positions, will fill the gap in between with any block you want. The quickest and easiest way to create buildings in Minecraft is by creating a cube and then hollowing it out by creating a cube of air in the middle.</a:t>
+            </a:r>
           </a:p>
         </p:txBody>
       </p:sp>
     </p:spTree>
     <p:extLst>
       <p:ext uri="{BB962C8B-B14F-4D97-AF65-F5344CB8AC3E}">
-        <p14:creationId xmlns:p14="http://schemas.microsoft.com/office/powerpoint/2010/main" val="1413358005"/>
+        <p14:creationId xmlns:p14="http://schemas.microsoft.com/office/powerpoint/2010/main" val="1128654317"/>
       </p:ext>
     </p:extLst>
   </p:cSld>
@@ -8628,7 +8701,7 @@
           <a:p>
             <a:r>
               <a:rPr lang="en-US" dirty="0" smtClean="0"/>
-              <a:t>Building an Ice House</a:t>
+              <a:t>Building an Ice  House</a:t>
             </a:r>
             <a:endParaRPr lang="en-US" dirty="0"/>
           </a:p>
@@ -8647,13 +8720,31 @@
         <p:spPr/>
         <p:txBody>
           <a:bodyPr>
-            <a:normAutofit fontScale="85000" lnSpcReduction="20000"/>
+            <a:normAutofit fontScale="55000" lnSpcReduction="20000"/>
           </a:bodyPr>
           <a:lstStyle/>
           <a:p>
             <a:r>
-              <a:rPr lang="en-US" dirty="0" smtClean="0"/>
-              <a:t>Save your </a:t>
+              <a:rPr lang="en-US" dirty="0"/>
+              <a:t>Open IDLE by clicking Menu &gt; Programming &gt; Python </a:t>
+            </a:r>
+            <a:r>
+              <a:rPr lang="en-US" dirty="0" smtClean="0"/>
+              <a:t>3. </a:t>
+            </a:r>
+          </a:p>
+          <a:p>
+            <a:r>
+              <a:rPr lang="en-US" dirty="0" smtClean="0"/>
+              <a:t>Use </a:t>
+            </a:r>
+            <a:r>
+              <a:rPr lang="en-US" dirty="0"/>
+              <a:t>File &gt; New Window to create a new program and save it </a:t>
+            </a:r>
+            <a:r>
+              <a:rPr lang="en-US" dirty="0" smtClean="0"/>
+              <a:t>as </a:t>
             </a:r>
             <a:r>
               <a:rPr lang="en-US" dirty="0" smtClean="0">
@@ -8665,29 +8756,21 @@
             </a:r>
             <a:r>
               <a:rPr lang="en-US" dirty="0" smtClean="0"/>
-              <a:t> file as </a:t>
-            </a:r>
-            <a:r>
-              <a:rPr lang="en-US" dirty="0" smtClean="0">
-                <a:latin typeface="Courier New" charset="0"/>
-                <a:ea typeface="Courier New" charset="0"/>
-                <a:cs typeface="Courier New" charset="0"/>
-              </a:rPr>
-              <a:t>icehouse2.py</a:t>
-            </a:r>
-            <a:r>
-              <a:rPr lang="en-US" dirty="0" smtClean="0"/>
               <a:t>.</a:t>
             </a:r>
           </a:p>
           <a:p>
             <a:r>
+              <a:rPr lang="en-US" dirty="0" smtClean="0"/>
+              <a:t>Import </a:t>
+            </a:r>
+            <a:r>
               <a:rPr lang="en-US" dirty="0"/>
-              <a:t>Add the code to your program to make a gap in the front of the ice cube for a </a:t>
-            </a:r>
-            <a:r>
-              <a:rPr lang="en-US" dirty="0" smtClean="0"/>
-              <a:t>door.</a:t>
+              <a:t>the minecraft and block </a:t>
+            </a:r>
+            <a:r>
+              <a:rPr lang="en-US" dirty="0" smtClean="0"/>
+              <a:t>modules.</a:t>
             </a:r>
           </a:p>
           <a:p>
@@ -8695,28 +8778,28 @@
               <a:buNone/>
             </a:pPr>
             <a:r>
-              <a:rPr lang="en-US" sz="3100" dirty="0" smtClean="0">
-                <a:latin typeface="Courier New" charset="0"/>
-                <a:ea typeface="Courier New" charset="0"/>
-                <a:cs typeface="Courier New" charset="0"/>
-              </a:rPr>
-              <a:t>mc.setBlocks(p.x </a:t>
-            </a:r>
-            <a:r>
-              <a:rPr lang="en-US" sz="3100" dirty="0">
-                <a:latin typeface="Courier New" charset="0"/>
-                <a:ea typeface="Courier New" charset="0"/>
-                <a:cs typeface="Courier New" charset="0"/>
-              </a:rPr>
-              <a:t>+ 5, p.y + 1, p.z + 1</a:t>
-            </a:r>
-            <a:r>
-              <a:rPr lang="en-US" sz="3100" dirty="0" smtClean="0">
-                <a:latin typeface="Courier New" charset="0"/>
-                <a:ea typeface="Courier New" charset="0"/>
-                <a:cs typeface="Courier New" charset="0"/>
-              </a:rPr>
-              <a:t>,</a:t>
+              <a:rPr lang="en-US" sz="3600" dirty="0" smtClean="0">
+                <a:latin typeface="Courier New" charset="0"/>
+                <a:ea typeface="Courier New" charset="0"/>
+                <a:cs typeface="Courier New" charset="0"/>
+              </a:rPr>
+              <a:t>import </a:t>
+            </a:r>
+            <a:r>
+              <a:rPr lang="en-US" sz="3600" dirty="0">
+                <a:latin typeface="Courier New" charset="0"/>
+                <a:ea typeface="Courier New" charset="0"/>
+                <a:cs typeface="Courier New" charset="0"/>
+              </a:rPr>
+              <a:t>mcpi.minecraft as </a:t>
+            </a:r>
+            <a:r>
+              <a:rPr lang="en-US" sz="3600" dirty="0" smtClean="0">
+                <a:latin typeface="Courier New" charset="0"/>
+                <a:ea typeface="Courier New" charset="0"/>
+                <a:cs typeface="Courier New" charset="0"/>
+              </a:rPr>
+              <a:t>minecraft</a:t>
             </a:r>
           </a:p>
           <a:p>
@@ -8724,28 +8807,42 @@
               <a:buNone/>
             </a:pPr>
             <a:r>
-              <a:rPr lang="en-US" sz="3100" dirty="0" smtClean="0">
-                <a:latin typeface="Courier New" charset="0"/>
-                <a:ea typeface="Courier New" charset="0"/>
-                <a:cs typeface="Courier New" charset="0"/>
-              </a:rPr>
-              <a:t>             </a:t>
-            </a:r>
-            <a:r>
-              <a:rPr lang="en-US" sz="3100" dirty="0">
-                <a:latin typeface="Courier New" charset="0"/>
-                <a:ea typeface="Courier New" charset="0"/>
-                <a:cs typeface="Courier New" charset="0"/>
-              </a:rPr>
-              <a:t>p.x + 6, p.y + 3, p.z </a:t>
-            </a:r>
-            <a:r>
-              <a:rPr lang="en-US" sz="3100" dirty="0" smtClean="0">
-                <a:latin typeface="Courier New" charset="0"/>
-                <a:ea typeface="Courier New" charset="0"/>
-                <a:cs typeface="Courier New" charset="0"/>
-              </a:rPr>
-              <a:t>+ 1,</a:t>
+              <a:rPr lang="en-US" sz="3600" dirty="0" smtClean="0">
+                <a:latin typeface="Courier New" charset="0"/>
+                <a:ea typeface="Courier New" charset="0"/>
+                <a:cs typeface="Courier New" charset="0"/>
+              </a:rPr>
+              <a:t>import </a:t>
+            </a:r>
+            <a:r>
+              <a:rPr lang="en-US" sz="3600" dirty="0">
+                <a:latin typeface="Courier New" charset="0"/>
+                <a:ea typeface="Courier New" charset="0"/>
+                <a:cs typeface="Courier New" charset="0"/>
+              </a:rPr>
+              <a:t>mcpi.block as </a:t>
+            </a:r>
+            <a:r>
+              <a:rPr lang="en-US" sz="3600" dirty="0" smtClean="0">
+                <a:latin typeface="Courier New" charset="0"/>
+                <a:ea typeface="Courier New" charset="0"/>
+                <a:cs typeface="Courier New" charset="0"/>
+              </a:rPr>
+              <a:t>block</a:t>
+            </a:r>
+          </a:p>
+          <a:p>
+            <a:r>
+              <a:rPr lang="en-US" dirty="0" smtClean="0"/>
+              <a:t>Create </a:t>
+            </a:r>
+            <a:r>
+              <a:rPr lang="en-US" dirty="0"/>
+              <a:t>a connection from your program to Minecraft and call it mc</a:t>
+            </a:r>
+            <a:r>
+              <a:rPr lang="en-US" dirty="0" smtClean="0"/>
+              <a:t>.</a:t>
             </a:r>
           </a:p>
           <a:p>
@@ -8753,105 +8850,137 @@
               <a:buNone/>
             </a:pPr>
             <a:r>
-              <a:rPr lang="en-US" sz="3100" dirty="0">
-                <a:latin typeface="Courier New" charset="0"/>
-                <a:ea typeface="Courier New" charset="0"/>
-                <a:cs typeface="Courier New" charset="0"/>
-              </a:rPr>
-              <a:t> </a:t>
-            </a:r>
-            <a:r>
-              <a:rPr lang="en-US" sz="3100" dirty="0" smtClean="0">
-                <a:latin typeface="Courier New" charset="0"/>
-                <a:ea typeface="Courier New" charset="0"/>
-                <a:cs typeface="Courier New" charset="0"/>
-              </a:rPr>
-              <a:t>            block.AIR)</a:t>
-            </a:r>
-          </a:p>
-          <a:p>
-            <a:r>
-              <a:rPr lang="en-US" dirty="0" smtClean="0"/>
-              <a:t>Use </a:t>
-            </a:r>
-            <a:r>
-              <a:rPr lang="en-US" dirty="0"/>
-              <a:t>setBlocks again to change the blocks on the floor to be </a:t>
-            </a:r>
-            <a:r>
-              <a:rPr lang="en-US" dirty="0" smtClean="0"/>
-              <a:t>made of </a:t>
-            </a:r>
-            <a:r>
-              <a:rPr lang="en-US" dirty="0"/>
-              <a:t>red </a:t>
-            </a:r>
-            <a:r>
-              <a:rPr lang="en-US" dirty="0" smtClean="0"/>
-              <a:t>wool.</a:t>
-            </a:r>
-          </a:p>
-          <a:p>
-            <a:pPr marL="0" indent="0">
-              <a:buNone/>
-            </a:pPr>
-            <a:r>
-              <a:rPr lang="en-US" sz="2800" dirty="0" smtClean="0">
-                <a:latin typeface="Courier New" charset="0"/>
-                <a:ea typeface="Courier New" charset="0"/>
-                <a:cs typeface="Courier New" charset="0"/>
-              </a:rPr>
-              <a:t>mc.setBlocks(p.x </a:t>
-            </a:r>
-            <a:r>
-              <a:rPr lang="en-US" sz="2800" dirty="0">
-                <a:latin typeface="Courier New" charset="0"/>
-                <a:ea typeface="Courier New" charset="0"/>
-                <a:cs typeface="Courier New" charset="0"/>
-              </a:rPr>
-              <a:t>+ 2, p.y, p.z + </a:t>
-            </a:r>
-            <a:r>
-              <a:rPr lang="en-US" sz="2800" dirty="0" smtClean="0">
-                <a:latin typeface="Courier New" charset="0"/>
-                <a:ea typeface="Courier New" charset="0"/>
-                <a:cs typeface="Courier New" charset="0"/>
-              </a:rPr>
-              <a:t>2,</a:t>
-            </a:r>
-          </a:p>
-          <a:p>
-            <a:pPr marL="0" indent="0">
-              <a:buNone/>
-            </a:pPr>
-            <a:r>
-              <a:rPr lang="en-US" sz="2800" dirty="0" smtClean="0">
-                <a:latin typeface="Courier New" charset="0"/>
-                <a:ea typeface="Courier New" charset="0"/>
-                <a:cs typeface="Courier New" charset="0"/>
-              </a:rPr>
-              <a:t>             p.x </a:t>
-            </a:r>
-            <a:r>
-              <a:rPr lang="en-US" sz="2800" dirty="0">
-                <a:latin typeface="Courier New" charset="0"/>
-                <a:ea typeface="Courier New" charset="0"/>
-                <a:cs typeface="Courier New" charset="0"/>
-              </a:rPr>
-              <a:t>+ 9, p.y, p.z + 9, </a:t>
-            </a:r>
-            <a:endParaRPr lang="en-US" sz="2800" dirty="0" smtClean="0">
+              <a:rPr lang="en-US" sz="3600" dirty="0" smtClean="0">
+                <a:latin typeface="Courier New" charset="0"/>
+                <a:ea typeface="Courier New" charset="0"/>
+                <a:cs typeface="Courier New" charset="0"/>
+              </a:rPr>
+              <a:t>mc </a:t>
+            </a:r>
+            <a:r>
+              <a:rPr lang="en-US" sz="3600" dirty="0">
+                <a:latin typeface="Courier New" charset="0"/>
+                <a:ea typeface="Courier New" charset="0"/>
+                <a:cs typeface="Courier New" charset="0"/>
+              </a:rPr>
+              <a:t>= minecraft.Minecraft.create</a:t>
+            </a:r>
+            <a:r>
+              <a:rPr lang="en-US" sz="3600" dirty="0" smtClean="0">
+                <a:latin typeface="Courier New" charset="0"/>
+                <a:ea typeface="Courier New" charset="0"/>
+                <a:cs typeface="Courier New" charset="0"/>
+              </a:rPr>
+              <a:t>()</a:t>
+            </a:r>
+            <a:endParaRPr lang="en-US" sz="3600" dirty="0">
               <a:latin typeface="Courier New" charset="0"/>
               <a:ea typeface="Courier New" charset="0"/>
               <a:cs typeface="Courier New" charset="0"/>
             </a:endParaRPr>
           </a:p>
           <a:p>
+            <a:r>
+              <a:rPr lang="en-US" dirty="0" smtClean="0"/>
+              <a:t>Get </a:t>
+            </a:r>
+            <a:r>
+              <a:rPr lang="en-US" dirty="0"/>
+              <a:t>the player’s </a:t>
+            </a:r>
+            <a:r>
+              <a:rPr lang="en-US" dirty="0" smtClean="0"/>
+              <a:t>position.</a:t>
+            </a:r>
+          </a:p>
+          <a:p>
             <a:pPr marL="0" indent="0">
               <a:buNone/>
             </a:pPr>
             <a:r>
-              <a:rPr lang="en-US" sz="2800" dirty="0">
+              <a:rPr lang="en-US" sz="3600" dirty="0" smtClean="0">
+                <a:latin typeface="Courier New" charset="0"/>
+                <a:ea typeface="Courier New" charset="0"/>
+                <a:cs typeface="Courier New" charset="0"/>
+              </a:rPr>
+              <a:t>p </a:t>
+            </a:r>
+            <a:r>
+              <a:rPr lang="en-US" sz="3600" dirty="0">
+                <a:latin typeface="Courier New" charset="0"/>
+                <a:ea typeface="Courier New" charset="0"/>
+                <a:cs typeface="Courier New" charset="0"/>
+              </a:rPr>
+              <a:t>= mc.player.getTilePos</a:t>
+            </a:r>
+            <a:r>
+              <a:rPr lang="en-US" sz="3600" dirty="0" smtClean="0">
+                <a:latin typeface="Courier New" charset="0"/>
+                <a:ea typeface="Courier New" charset="0"/>
+                <a:cs typeface="Courier New" charset="0"/>
+              </a:rPr>
+              <a:t>()</a:t>
+            </a:r>
+            <a:endParaRPr lang="en-US" sz="3600" dirty="0">
+              <a:latin typeface="Courier New" charset="0"/>
+              <a:ea typeface="Courier New" charset="0"/>
+              <a:cs typeface="Courier New" charset="0"/>
+            </a:endParaRPr>
+          </a:p>
+          <a:p>
+            <a:r>
+              <a:rPr lang="en-US" dirty="0" smtClean="0"/>
+              <a:t>Use </a:t>
+            </a:r>
+            <a:r>
+              <a:rPr lang="en-US" dirty="0"/>
+              <a:t>the setBlocks() function to create a cube of ice next to </a:t>
+            </a:r>
+            <a:r>
+              <a:rPr lang="en-US" dirty="0" smtClean="0"/>
+              <a:t>Steve of </a:t>
+            </a:r>
+            <a:r>
+              <a:rPr lang="en-US" dirty="0"/>
+              <a:t>size 11 x 5 x </a:t>
+            </a:r>
+            <a:r>
+              <a:rPr lang="en-US" dirty="0" smtClean="0"/>
+              <a:t>11.</a:t>
+            </a:r>
+          </a:p>
+          <a:p>
+            <a:pPr marL="0" indent="0">
+              <a:buNone/>
+            </a:pPr>
+            <a:r>
+              <a:rPr lang="en-US" sz="3600" dirty="0" smtClean="0">
+                <a:latin typeface="Courier New" charset="0"/>
+                <a:ea typeface="Courier New" charset="0"/>
+                <a:cs typeface="Courier New" charset="0"/>
+              </a:rPr>
+              <a:t>mc.setBlocks(p.x </a:t>
+            </a:r>
+            <a:r>
+              <a:rPr lang="en-US" sz="3600" dirty="0">
+                <a:latin typeface="Courier New" charset="0"/>
+                <a:ea typeface="Courier New" charset="0"/>
+                <a:cs typeface="Courier New" charset="0"/>
+              </a:rPr>
+              <a:t>+ 1, p.y, p.z + 1, </a:t>
+            </a:r>
+            <a:endParaRPr lang="en-US" sz="3600" dirty="0" smtClean="0">
+              <a:latin typeface="Courier New" charset="0"/>
+              <a:ea typeface="Courier New" charset="0"/>
+              <a:cs typeface="Courier New" charset="0"/>
+            </a:endParaRPr>
+          </a:p>
+          <a:p>
+            <a:pPr marL="0" indent="0">
+              <a:buNone/>
+            </a:pPr>
+            <a:r>
+              <a:rPr lang="en-US" sz="3600" dirty="0">
                 <a:latin typeface="Courier New" charset="0"/>
                 <a:ea typeface="Courier New" charset="0"/>
                 <a:cs typeface="Courier New" charset="0"/>
@@ -8859,34 +8988,119 @@
               <a:t> </a:t>
             </a:r>
             <a:r>
-              <a:rPr lang="en-US" sz="2800" dirty="0" smtClean="0">
-                <a:latin typeface="Courier New" charset="0"/>
-                <a:ea typeface="Courier New" charset="0"/>
-                <a:cs typeface="Courier New" charset="0"/>
-              </a:rPr>
-              <a:t>            block.WOOL.id</a:t>
-            </a:r>
-            <a:r>
-              <a:rPr lang="en-US" sz="2800" dirty="0">
-                <a:latin typeface="Courier New" charset="0"/>
-                <a:ea typeface="Courier New" charset="0"/>
-                <a:cs typeface="Courier New" charset="0"/>
-              </a:rPr>
-              <a:t>, 14</a:t>
-            </a:r>
-            <a:r>
-              <a:rPr lang="en-US" sz="2800" dirty="0" smtClean="0">
-                <a:latin typeface="Courier New" charset="0"/>
-                <a:ea typeface="Courier New" charset="0"/>
-                <a:cs typeface="Courier New" charset="0"/>
-              </a:rPr>
-              <a:t>)</a:t>
-            </a:r>
-          </a:p>
-          <a:p>
+              <a:rPr lang="en-US" sz="3600" dirty="0" smtClean="0">
+                <a:latin typeface="Courier New" charset="0"/>
+                <a:ea typeface="Courier New" charset="0"/>
+                <a:cs typeface="Courier New" charset="0"/>
+              </a:rPr>
+              <a:t>            p.x </a:t>
+            </a:r>
+            <a:r>
+              <a:rPr lang="en-US" sz="3600" dirty="0">
+                <a:latin typeface="Courier New" charset="0"/>
+                <a:ea typeface="Courier New" charset="0"/>
+                <a:cs typeface="Courier New" charset="0"/>
+              </a:rPr>
+              <a:t>+ 10, p.y + 5, p.z + </a:t>
+            </a:r>
+            <a:r>
+              <a:rPr lang="en-US" sz="3600" dirty="0" smtClean="0">
+                <a:latin typeface="Courier New" charset="0"/>
+                <a:ea typeface="Courier New" charset="0"/>
+                <a:cs typeface="Courier New" charset="0"/>
+              </a:rPr>
+              <a:t>10,block.ICE)</a:t>
+            </a:r>
+          </a:p>
+          <a:p>
+            <a:r>
+              <a:rPr lang="en-US" dirty="0" smtClean="0"/>
+              <a:t>Create </a:t>
+            </a:r>
             <a:r>
               <a:rPr lang="en-US" dirty="0"/>
-              <a:t>Run your program by clicking Run &gt; Run Module.</a:t>
+              <a:t>a cube of air inside the ice, making it hollow: </a:t>
+            </a:r>
+          </a:p>
+          <a:p>
+            <a:pPr marL="0" indent="0">
+              <a:buNone/>
+            </a:pPr>
+            <a:r>
+              <a:rPr lang="en-US" sz="3400" dirty="0" smtClean="0">
+                <a:latin typeface="Courier New" charset="0"/>
+                <a:ea typeface="Courier New" charset="0"/>
+                <a:cs typeface="Courier New" charset="0"/>
+              </a:rPr>
+              <a:t>mc.setBlocks(p.x </a:t>
+            </a:r>
+            <a:r>
+              <a:rPr lang="en-US" sz="3400" dirty="0">
+                <a:latin typeface="Courier New" charset="0"/>
+                <a:ea typeface="Courier New" charset="0"/>
+                <a:cs typeface="Courier New" charset="0"/>
+              </a:rPr>
+              <a:t>+ 2, p.y + 1, p.z + 2, </a:t>
+            </a:r>
+            <a:endParaRPr lang="en-US" sz="3400" dirty="0" smtClean="0">
+              <a:latin typeface="Courier New" charset="0"/>
+              <a:ea typeface="Courier New" charset="0"/>
+              <a:cs typeface="Courier New" charset="0"/>
+            </a:endParaRPr>
+          </a:p>
+          <a:p>
+            <a:pPr marL="0" indent="0">
+              <a:buNone/>
+            </a:pPr>
+            <a:r>
+              <a:rPr lang="en-US" sz="3400" dirty="0" smtClean="0">
+                <a:latin typeface="Courier New" charset="0"/>
+                <a:ea typeface="Courier New" charset="0"/>
+                <a:cs typeface="Courier New" charset="0"/>
+              </a:rPr>
+              <a:t>             p.x </a:t>
+            </a:r>
+            <a:r>
+              <a:rPr lang="en-US" sz="3400" dirty="0">
+                <a:latin typeface="Courier New" charset="0"/>
+                <a:ea typeface="Courier New" charset="0"/>
+                <a:cs typeface="Courier New" charset="0"/>
+              </a:rPr>
+              <a:t>+ 9, </a:t>
+            </a:r>
+            <a:r>
+              <a:rPr lang="en-US" sz="3400" dirty="0" smtClean="0">
+                <a:latin typeface="Courier New" charset="0"/>
+                <a:ea typeface="Courier New" charset="0"/>
+                <a:cs typeface="Courier New" charset="0"/>
+              </a:rPr>
+              <a:t>p.y </a:t>
+            </a:r>
+            <a:r>
+              <a:rPr lang="en-US" sz="3400" dirty="0">
+                <a:latin typeface="Courier New" charset="0"/>
+                <a:ea typeface="Courier New" charset="0"/>
+                <a:cs typeface="Courier New" charset="0"/>
+              </a:rPr>
+              <a:t>+ 4, p.z + </a:t>
+            </a:r>
+            <a:r>
+              <a:rPr lang="en-US" sz="3400" dirty="0" smtClean="0">
+                <a:latin typeface="Courier New" charset="0"/>
+                <a:ea typeface="Courier New" charset="0"/>
+                <a:cs typeface="Courier New" charset="0"/>
+              </a:rPr>
+              <a:t>9,block.AIR)</a:t>
+            </a:r>
+          </a:p>
+          <a:p>
+            <a:r>
+              <a:rPr lang="en-US" dirty="0" smtClean="0"/>
+              <a:t>Run </a:t>
+            </a:r>
+            <a:r>
+              <a:rPr lang="en-US" dirty="0"/>
+              <a:t>your program by clicking Run &gt; Run Module.</a:t>
             </a:r>
           </a:p>
         </p:txBody>
@@ -8894,7 +9108,7 @@
     </p:spTree>
     <p:extLst>
       <p:ext uri="{BB962C8B-B14F-4D97-AF65-F5344CB8AC3E}">
-        <p14:creationId xmlns:p14="http://schemas.microsoft.com/office/powerpoint/2010/main" val="1437880073"/>
+        <p14:creationId xmlns:p14="http://schemas.microsoft.com/office/powerpoint/2010/main" val="104629221"/>
       </p:ext>
     </p:extLst>
   </p:cSld>
@@ -8961,7 +9175,7 @@
           <a:p>
             <a:r>
               <a:rPr lang="en-US" dirty="0"/>
-              <a:t>A door will now appear in the ice house and a red wool carpet will be on the floor</a:t>
+              <a:t>A large cube of ice will appear next to Steve; if you break some of the ice blocks, you’ll see that it’s hollow and you can walk inside</a:t>
             </a:r>
             <a:r>
               <a:rPr lang="en-US" dirty="0" smtClean="0"/>
@@ -8975,34 +9189,22 @@
             </a:r>
             <a:r>
               <a:rPr lang="en-US" dirty="0"/>
-              <a:t>number 14 on the line block.WOOL.id, 14 makes the wool red. </a:t>
-            </a:r>
-            <a:endParaRPr lang="en-US" dirty="0" smtClean="0"/>
-          </a:p>
-          <a:p>
-            <a:r>
-              <a:rPr lang="en-US" dirty="0" smtClean="0"/>
-              <a:t>Try </a:t>
-            </a:r>
-            <a:r>
-              <a:rPr lang="en-US" dirty="0"/>
-              <a:t>changing it to a different number between 0 – 15 and running the program again, until you find a </a:t>
-            </a:r>
-            <a:r>
-              <a:rPr lang="en-US" dirty="0" smtClean="0"/>
-              <a:t>color </a:t>
-            </a:r>
-            <a:r>
-              <a:rPr lang="en-US" dirty="0"/>
-              <a:t>you like.</a:t>
-            </a:r>
+              <a:t>ice house is still pretty basic and at the moment there’s no way to get in, so modify your program to create a door and put some carpet on the </a:t>
+            </a:r>
+            <a:r>
+              <a:rPr lang="en-US" dirty="0" smtClean="0"/>
+              <a:t>floor.</a:t>
+            </a:r>
+          </a:p>
+          <a:p>
+            <a:endParaRPr lang="en-US" dirty="0"/>
           </a:p>
         </p:txBody>
       </p:sp>
     </p:spTree>
     <p:extLst>
       <p:ext uri="{BB962C8B-B14F-4D97-AF65-F5344CB8AC3E}">
-        <p14:creationId xmlns:p14="http://schemas.microsoft.com/office/powerpoint/2010/main" val="299251874"/>
+        <p14:creationId xmlns:p14="http://schemas.microsoft.com/office/powerpoint/2010/main" val="1413358005"/>
       </p:ext>
     </p:extLst>
   </p:cSld>
@@ -9046,6 +9248,424 @@
           <a:p>
             <a:r>
               <a:rPr lang="en-US" dirty="0" smtClean="0"/>
+              <a:t>Building an Ice House</a:t>
+            </a:r>
+            <a:endParaRPr lang="en-US" dirty="0"/>
+          </a:p>
+        </p:txBody>
+      </p:sp>
+      <p:sp>
+        <p:nvSpPr>
+          <p:cNvPr id="3" name="Content Placeholder 2"/>
+          <p:cNvSpPr>
+            <a:spLocks noGrp="1"/>
+          </p:cNvSpPr>
+          <p:nvPr>
+            <p:ph idx="1"/>
+          </p:nvPr>
+        </p:nvSpPr>
+        <p:spPr/>
+        <p:txBody>
+          <a:bodyPr>
+            <a:normAutofit fontScale="85000" lnSpcReduction="20000"/>
+          </a:bodyPr>
+          <a:lstStyle/>
+          <a:p>
+            <a:r>
+              <a:rPr lang="en-US" dirty="0" smtClean="0"/>
+              <a:t>Save your </a:t>
+            </a:r>
+            <a:r>
+              <a:rPr lang="en-US" dirty="0" smtClean="0">
+                <a:latin typeface="Courier New" charset="0"/>
+                <a:ea typeface="Courier New" charset="0"/>
+                <a:cs typeface="Courier New" charset="0"/>
+              </a:rPr>
+              <a:t>icehouse1.py</a:t>
+            </a:r>
+            <a:r>
+              <a:rPr lang="en-US" dirty="0" smtClean="0"/>
+              <a:t> file as </a:t>
+            </a:r>
+            <a:r>
+              <a:rPr lang="en-US" dirty="0" smtClean="0">
+                <a:latin typeface="Courier New" charset="0"/>
+                <a:ea typeface="Courier New" charset="0"/>
+                <a:cs typeface="Courier New" charset="0"/>
+              </a:rPr>
+              <a:t>icehouse2.py</a:t>
+            </a:r>
+            <a:r>
+              <a:rPr lang="en-US" dirty="0" smtClean="0"/>
+              <a:t>.</a:t>
+            </a:r>
+          </a:p>
+          <a:p>
+            <a:r>
+              <a:rPr lang="en-US" dirty="0"/>
+              <a:t>Add the code to your program to make a gap in the front of the ice cube for a </a:t>
+            </a:r>
+            <a:r>
+              <a:rPr lang="en-US" dirty="0" smtClean="0"/>
+              <a:t>door.</a:t>
+            </a:r>
+          </a:p>
+          <a:p>
+            <a:pPr marL="0" indent="0">
+              <a:buNone/>
+            </a:pPr>
+            <a:r>
+              <a:rPr lang="en-US" sz="3100" dirty="0" smtClean="0">
+                <a:latin typeface="Courier New" charset="0"/>
+                <a:ea typeface="Courier New" charset="0"/>
+                <a:cs typeface="Courier New" charset="0"/>
+              </a:rPr>
+              <a:t>mc.setBlocks(p.x </a:t>
+            </a:r>
+            <a:r>
+              <a:rPr lang="en-US" sz="3100" dirty="0">
+                <a:latin typeface="Courier New" charset="0"/>
+                <a:ea typeface="Courier New" charset="0"/>
+                <a:cs typeface="Courier New" charset="0"/>
+              </a:rPr>
+              <a:t>+ 5, p.y + 1, p.z + 1</a:t>
+            </a:r>
+            <a:r>
+              <a:rPr lang="en-US" sz="3100" dirty="0" smtClean="0">
+                <a:latin typeface="Courier New" charset="0"/>
+                <a:ea typeface="Courier New" charset="0"/>
+                <a:cs typeface="Courier New" charset="0"/>
+              </a:rPr>
+              <a:t>,</a:t>
+            </a:r>
+          </a:p>
+          <a:p>
+            <a:pPr marL="0" indent="0">
+              <a:buNone/>
+            </a:pPr>
+            <a:r>
+              <a:rPr lang="en-US" sz="3100" dirty="0" smtClean="0">
+                <a:latin typeface="Courier New" charset="0"/>
+                <a:ea typeface="Courier New" charset="0"/>
+                <a:cs typeface="Courier New" charset="0"/>
+              </a:rPr>
+              <a:t>             </a:t>
+            </a:r>
+            <a:r>
+              <a:rPr lang="en-US" sz="3100" dirty="0">
+                <a:latin typeface="Courier New" charset="0"/>
+                <a:ea typeface="Courier New" charset="0"/>
+                <a:cs typeface="Courier New" charset="0"/>
+              </a:rPr>
+              <a:t>p.x + 6, p.y + 3, p.z </a:t>
+            </a:r>
+            <a:r>
+              <a:rPr lang="en-US" sz="3100" dirty="0" smtClean="0">
+                <a:latin typeface="Courier New" charset="0"/>
+                <a:ea typeface="Courier New" charset="0"/>
+                <a:cs typeface="Courier New" charset="0"/>
+              </a:rPr>
+              <a:t>+ 1,</a:t>
+            </a:r>
+          </a:p>
+          <a:p>
+            <a:pPr marL="0" indent="0">
+              <a:buNone/>
+            </a:pPr>
+            <a:r>
+              <a:rPr lang="en-US" sz="3100" dirty="0">
+                <a:latin typeface="Courier New" charset="0"/>
+                <a:ea typeface="Courier New" charset="0"/>
+                <a:cs typeface="Courier New" charset="0"/>
+              </a:rPr>
+              <a:t> </a:t>
+            </a:r>
+            <a:r>
+              <a:rPr lang="en-US" sz="3100" dirty="0" smtClean="0">
+                <a:latin typeface="Courier New" charset="0"/>
+                <a:ea typeface="Courier New" charset="0"/>
+                <a:cs typeface="Courier New" charset="0"/>
+              </a:rPr>
+              <a:t>            block.AIR)</a:t>
+            </a:r>
+          </a:p>
+          <a:p>
+            <a:r>
+              <a:rPr lang="en-US" dirty="0" smtClean="0"/>
+              <a:t>Use </a:t>
+            </a:r>
+            <a:r>
+              <a:rPr lang="en-US" dirty="0"/>
+              <a:t>setBlocks again to change the blocks on the floor to be </a:t>
+            </a:r>
+            <a:r>
+              <a:rPr lang="en-US" dirty="0" smtClean="0"/>
+              <a:t>made of </a:t>
+            </a:r>
+            <a:r>
+              <a:rPr lang="en-US" dirty="0"/>
+              <a:t>red </a:t>
+            </a:r>
+            <a:r>
+              <a:rPr lang="en-US" dirty="0" smtClean="0"/>
+              <a:t>wool.</a:t>
+            </a:r>
+          </a:p>
+          <a:p>
+            <a:pPr marL="0" indent="0">
+              <a:buNone/>
+            </a:pPr>
+            <a:r>
+              <a:rPr lang="en-US" sz="2800" dirty="0" smtClean="0">
+                <a:latin typeface="Courier New" charset="0"/>
+                <a:ea typeface="Courier New" charset="0"/>
+                <a:cs typeface="Courier New" charset="0"/>
+              </a:rPr>
+              <a:t>mc.setBlocks(p.x </a:t>
+            </a:r>
+            <a:r>
+              <a:rPr lang="en-US" sz="2800" dirty="0">
+                <a:latin typeface="Courier New" charset="0"/>
+                <a:ea typeface="Courier New" charset="0"/>
+                <a:cs typeface="Courier New" charset="0"/>
+              </a:rPr>
+              <a:t>+ 2, p.y, p.z + </a:t>
+            </a:r>
+            <a:r>
+              <a:rPr lang="en-US" sz="2800" dirty="0" smtClean="0">
+                <a:latin typeface="Courier New" charset="0"/>
+                <a:ea typeface="Courier New" charset="0"/>
+                <a:cs typeface="Courier New" charset="0"/>
+              </a:rPr>
+              <a:t>2,</a:t>
+            </a:r>
+          </a:p>
+          <a:p>
+            <a:pPr marL="0" indent="0">
+              <a:buNone/>
+            </a:pPr>
+            <a:r>
+              <a:rPr lang="en-US" sz="2800" dirty="0" smtClean="0">
+                <a:latin typeface="Courier New" charset="0"/>
+                <a:ea typeface="Courier New" charset="0"/>
+                <a:cs typeface="Courier New" charset="0"/>
+              </a:rPr>
+              <a:t>             p.x </a:t>
+            </a:r>
+            <a:r>
+              <a:rPr lang="en-US" sz="2800" dirty="0">
+                <a:latin typeface="Courier New" charset="0"/>
+                <a:ea typeface="Courier New" charset="0"/>
+                <a:cs typeface="Courier New" charset="0"/>
+              </a:rPr>
+              <a:t>+ 9, p.y, p.z + 9, </a:t>
+            </a:r>
+            <a:endParaRPr lang="en-US" sz="2800" dirty="0" smtClean="0">
+              <a:latin typeface="Courier New" charset="0"/>
+              <a:ea typeface="Courier New" charset="0"/>
+              <a:cs typeface="Courier New" charset="0"/>
+            </a:endParaRPr>
+          </a:p>
+          <a:p>
+            <a:pPr marL="0" indent="0">
+              <a:buNone/>
+            </a:pPr>
+            <a:r>
+              <a:rPr lang="en-US" sz="2800" dirty="0">
+                <a:latin typeface="Courier New" charset="0"/>
+                <a:ea typeface="Courier New" charset="0"/>
+                <a:cs typeface="Courier New" charset="0"/>
+              </a:rPr>
+              <a:t> </a:t>
+            </a:r>
+            <a:r>
+              <a:rPr lang="en-US" sz="2800" dirty="0" smtClean="0">
+                <a:latin typeface="Courier New" charset="0"/>
+                <a:ea typeface="Courier New" charset="0"/>
+                <a:cs typeface="Courier New" charset="0"/>
+              </a:rPr>
+              <a:t>            block.WOOL.id</a:t>
+            </a:r>
+            <a:r>
+              <a:rPr lang="en-US" sz="2800" dirty="0">
+                <a:latin typeface="Courier New" charset="0"/>
+                <a:ea typeface="Courier New" charset="0"/>
+                <a:cs typeface="Courier New" charset="0"/>
+              </a:rPr>
+              <a:t>, 14</a:t>
+            </a:r>
+            <a:r>
+              <a:rPr lang="en-US" sz="2800" dirty="0" smtClean="0">
+                <a:latin typeface="Courier New" charset="0"/>
+                <a:ea typeface="Courier New" charset="0"/>
+                <a:cs typeface="Courier New" charset="0"/>
+              </a:rPr>
+              <a:t>)</a:t>
+            </a:r>
+          </a:p>
+          <a:p>
+            <a:r>
+              <a:rPr lang="en-US" dirty="0"/>
+              <a:t>Run your program by clicking Run &gt; Run Module.</a:t>
+            </a:r>
+          </a:p>
+        </p:txBody>
+      </p:sp>
+    </p:spTree>
+    <p:extLst>
+      <p:ext uri="{BB962C8B-B14F-4D97-AF65-F5344CB8AC3E}">
+        <p14:creationId xmlns:p14="http://schemas.microsoft.com/office/powerpoint/2010/main" val="1437880073"/>
+      </p:ext>
+    </p:extLst>
+  </p:cSld>
+  <p:clrMapOvr>
+    <a:masterClrMapping/>
+  </p:clrMapOvr>
+</p:sld>
+</file>
+
+<file path=ppt/slides/slide27.xml><?xml version="1.0" encoding="utf-8"?>
+<p:sld xmlns:a="http://schemas.openxmlformats.org/drawingml/2006/main" xmlns:r="http://schemas.openxmlformats.org/officeDocument/2006/relationships" xmlns:p="http://schemas.openxmlformats.org/presentationml/2006/main">
+  <p:cSld>
+    <p:spTree>
+      <p:nvGrpSpPr>
+        <p:cNvPr id="1" name=""/>
+        <p:cNvGrpSpPr/>
+        <p:nvPr/>
+      </p:nvGrpSpPr>
+      <p:grpSpPr>
+        <a:xfrm>
+          <a:off x="0" y="0"/>
+          <a:ext cx="0" cy="0"/>
+          <a:chOff x="0" y="0"/>
+          <a:chExt cx="0" cy="0"/>
+        </a:xfrm>
+      </p:grpSpPr>
+      <p:sp>
+        <p:nvSpPr>
+          <p:cNvPr id="2" name="Title 1"/>
+          <p:cNvSpPr>
+            <a:spLocks noGrp="1"/>
+          </p:cNvSpPr>
+          <p:nvPr>
+            <p:ph type="title"/>
+          </p:nvPr>
+        </p:nvSpPr>
+        <p:spPr/>
+        <p:txBody>
+          <a:bodyPr/>
+          <a:lstStyle/>
+          <a:p>
+            <a:r>
+              <a:rPr lang="en-US" dirty="0" smtClean="0"/>
+              <a:t>Building an Ice House</a:t>
+            </a:r>
+            <a:endParaRPr lang="en-US" dirty="0"/>
+          </a:p>
+        </p:txBody>
+      </p:sp>
+      <p:sp>
+        <p:nvSpPr>
+          <p:cNvPr id="3" name="Content Placeholder 2"/>
+          <p:cNvSpPr>
+            <a:spLocks noGrp="1"/>
+          </p:cNvSpPr>
+          <p:nvPr>
+            <p:ph idx="1"/>
+          </p:nvPr>
+        </p:nvSpPr>
+        <p:spPr/>
+        <p:txBody>
+          <a:bodyPr/>
+          <a:lstStyle/>
+          <a:p>
+            <a:r>
+              <a:rPr lang="en-US" dirty="0"/>
+              <a:t>A door will now appear in the ice house and a red wool carpet will be on the floor</a:t>
+            </a:r>
+            <a:r>
+              <a:rPr lang="en-US" dirty="0" smtClean="0"/>
+              <a:t>.</a:t>
+            </a:r>
+          </a:p>
+          <a:p>
+            <a:r>
+              <a:rPr lang="en-US" dirty="0" smtClean="0"/>
+              <a:t>The </a:t>
+            </a:r>
+            <a:r>
+              <a:rPr lang="en-US" dirty="0"/>
+              <a:t>number 14 on the line block.WOOL.id, 14 makes the wool red. </a:t>
+            </a:r>
+            <a:endParaRPr lang="en-US" dirty="0" smtClean="0"/>
+          </a:p>
+          <a:p>
+            <a:r>
+              <a:rPr lang="en-US" dirty="0" smtClean="0"/>
+              <a:t>Try </a:t>
+            </a:r>
+            <a:r>
+              <a:rPr lang="en-US" dirty="0"/>
+              <a:t>changing it to a different number between 0 – 15 and running the program again, until you find a </a:t>
+            </a:r>
+            <a:r>
+              <a:rPr lang="en-US" dirty="0" smtClean="0"/>
+              <a:t>color </a:t>
+            </a:r>
+            <a:r>
+              <a:rPr lang="en-US" dirty="0"/>
+              <a:t>you like.</a:t>
+            </a:r>
+          </a:p>
+        </p:txBody>
+      </p:sp>
+    </p:spTree>
+    <p:extLst>
+      <p:ext uri="{BB962C8B-B14F-4D97-AF65-F5344CB8AC3E}">
+        <p14:creationId xmlns:p14="http://schemas.microsoft.com/office/powerpoint/2010/main" val="299251874"/>
+      </p:ext>
+    </p:extLst>
+  </p:cSld>
+  <p:clrMapOvr>
+    <a:masterClrMapping/>
+  </p:clrMapOvr>
+</p:sld>
+</file>
+
+<file path=ppt/slides/slide28.xml><?xml version="1.0" encoding="utf-8"?>
+<p:sld xmlns:a="http://schemas.openxmlformats.org/drawingml/2006/main" xmlns:r="http://schemas.openxmlformats.org/officeDocument/2006/relationships" xmlns:p="http://schemas.openxmlformats.org/presentationml/2006/main">
+  <p:cSld>
+    <p:spTree>
+      <p:nvGrpSpPr>
+        <p:cNvPr id="1" name=""/>
+        <p:cNvGrpSpPr/>
+        <p:nvPr/>
+      </p:nvGrpSpPr>
+      <p:grpSpPr>
+        <a:xfrm>
+          <a:off x="0" y="0"/>
+          <a:ext cx="0" cy="0"/>
+          <a:chOff x="0" y="0"/>
+          <a:chExt cx="0" cy="0"/>
+        </a:xfrm>
+      </p:grpSpPr>
+      <p:sp>
+        <p:nvSpPr>
+          <p:cNvPr id="2" name="Title 1"/>
+          <p:cNvSpPr>
+            <a:spLocks noGrp="1"/>
+          </p:cNvSpPr>
+          <p:nvPr>
+            <p:ph type="title"/>
+          </p:nvPr>
+        </p:nvSpPr>
+        <p:spPr/>
+        <p:txBody>
+          <a:bodyPr/>
+          <a:lstStyle/>
+          <a:p>
+            <a:r>
+              <a:rPr lang="en-US" dirty="0" smtClean="0"/>
               <a:t>Code: icehouse2.py</a:t>
             </a:r>
             <a:endParaRPr lang="en-US" dirty="0"/>
@@ -9469,7 +10089,7 @@
 </p:sld>
 </file>
 
-<file path=ppt/slides/slide27.xml><?xml version="1.0" encoding="utf-8"?>
+<file path=ppt/slides/slide29.xml><?xml version="1.0" encoding="utf-8"?>
 <p:sld xmlns:a="http://schemas.openxmlformats.org/drawingml/2006/main" xmlns:r="http://schemas.openxmlformats.org/officeDocument/2006/relationships" xmlns:p="http://schemas.openxmlformats.org/presentationml/2006/main">
   <p:cSld>
     <p:spTree>
@@ -9548,281 +10168,6 @@
 </p:sld>
 </file>
 
-<file path=ppt/slides/slide28.xml><?xml version="1.0" encoding="utf-8"?>
-<p:sld xmlns:a="http://schemas.openxmlformats.org/drawingml/2006/main" xmlns:r="http://schemas.openxmlformats.org/officeDocument/2006/relationships" xmlns:p="http://schemas.openxmlformats.org/presentationml/2006/main">
-  <p:cSld>
-    <p:spTree>
-      <p:nvGrpSpPr>
-        <p:cNvPr id="1" name=""/>
-        <p:cNvGrpSpPr/>
-        <p:nvPr/>
-      </p:nvGrpSpPr>
-      <p:grpSpPr>
-        <a:xfrm>
-          <a:off x="0" y="0"/>
-          <a:ext cx="0" cy="0"/>
-          <a:chOff x="0" y="0"/>
-          <a:chExt cx="0" cy="0"/>
-        </a:xfrm>
-      </p:grpSpPr>
-      <p:sp>
-        <p:nvSpPr>
-          <p:cNvPr id="4" name="Title 3"/>
-          <p:cNvSpPr>
-            <a:spLocks noGrp="1"/>
-          </p:cNvSpPr>
-          <p:nvPr>
-            <p:ph type="title"/>
-          </p:nvPr>
-        </p:nvSpPr>
-        <p:spPr>
-          <a:xfrm>
-            <a:off x="963084" y="1542098"/>
-            <a:ext cx="10363200" cy="1362075"/>
-          </a:xfrm>
-        </p:spPr>
-        <p:txBody>
-          <a:bodyPr/>
-          <a:lstStyle/>
-          <a:p>
-            <a:pPr algn="ctr"/>
-            <a:r>
-              <a:rPr lang="en-US" dirty="0" smtClean="0"/>
-              <a:t>LAB TIME </a:t>
-            </a:r>
-            <a:endParaRPr lang="en-US" dirty="0"/>
-          </a:p>
-        </p:txBody>
-      </p:sp>
-      <p:sp>
-        <p:nvSpPr>
-          <p:cNvPr id="2" name="Text Placeholder 1"/>
-          <p:cNvSpPr>
-            <a:spLocks noGrp="1"/>
-          </p:cNvSpPr>
-          <p:nvPr>
-            <p:ph type="body" idx="1"/>
-          </p:nvPr>
-        </p:nvSpPr>
-        <p:spPr>
-          <a:xfrm>
-            <a:off x="963084" y="2621281"/>
-            <a:ext cx="10363200" cy="3403600"/>
-          </a:xfrm>
-        </p:spPr>
-        <p:txBody>
-          <a:bodyPr>
-            <a:normAutofit fontScale="92500" lnSpcReduction="10000"/>
-          </a:bodyPr>
-          <a:lstStyle/>
-          <a:p>
-            <a:pPr marL="457200" indent="-457200">
-              <a:buFont typeface="Arial" charset="0"/>
-              <a:buChar char="•"/>
-            </a:pPr>
-            <a:r>
-              <a:rPr lang="en-US" dirty="0" smtClean="0">
-                <a:solidFill>
-                  <a:schemeClr val="tx1"/>
-                </a:solidFill>
-              </a:rPr>
-              <a:t>Use the remainder of class to explore the </a:t>
-            </a:r>
-            <a:r>
-              <a:rPr lang="en-US" dirty="0" smtClean="0">
-                <a:solidFill>
-                  <a:schemeClr val="tx1"/>
-                </a:solidFill>
-              </a:rPr>
-              <a:t>ice house </a:t>
-            </a:r>
-            <a:r>
-              <a:rPr lang="en-US" dirty="0" smtClean="0">
-                <a:solidFill>
-                  <a:schemeClr val="tx1"/>
-                </a:solidFill>
-              </a:rPr>
-              <a:t>code. Try different values </a:t>
-            </a:r>
-            <a:r>
-              <a:rPr lang="en-US" dirty="0" smtClean="0">
-                <a:solidFill>
-                  <a:schemeClr val="tx1"/>
-                </a:solidFill>
-              </a:rPr>
-              <a:t>for the blocks and size of the house. Make as many houses as you want!</a:t>
-            </a:r>
-            <a:endParaRPr lang="en-US" dirty="0">
-              <a:solidFill>
-                <a:schemeClr val="tx1"/>
-              </a:solidFill>
-            </a:endParaRPr>
-          </a:p>
-          <a:p>
-            <a:pPr marL="457200" indent="-457200">
-              <a:buFont typeface="Arial" charset="0"/>
-              <a:buChar char="•"/>
-            </a:pPr>
-            <a:r>
-              <a:rPr lang="en-US" dirty="0" smtClean="0">
-                <a:solidFill>
-                  <a:schemeClr val="tx1"/>
-                </a:solidFill>
-              </a:rPr>
-              <a:t>You can leave when you’re finished.</a:t>
-            </a:r>
-            <a:endParaRPr lang="en-US" dirty="0">
-              <a:solidFill>
-                <a:schemeClr val="tx1"/>
-              </a:solidFill>
-            </a:endParaRPr>
-          </a:p>
-          <a:p>
-            <a:pPr marL="457200" indent="-457200">
-              <a:buFont typeface="Arial" charset="0"/>
-              <a:buChar char="•"/>
-            </a:pPr>
-            <a:r>
-              <a:rPr lang="en-US" b="1" dirty="0" smtClean="0">
-                <a:solidFill>
-                  <a:schemeClr val="tx1"/>
-                </a:solidFill>
-              </a:rPr>
-              <a:t>DO NOT DISTURB </a:t>
-            </a:r>
-            <a:r>
-              <a:rPr lang="en-US" dirty="0" smtClean="0">
-                <a:solidFill>
-                  <a:schemeClr val="tx1"/>
-                </a:solidFill>
-              </a:rPr>
-              <a:t>the other classes!</a:t>
-            </a:r>
-            <a:endParaRPr lang="en-US" b="1" dirty="0">
-              <a:solidFill>
-                <a:schemeClr val="tx1"/>
-              </a:solidFill>
-            </a:endParaRPr>
-          </a:p>
-          <a:p>
-            <a:pPr marL="457200" indent="-457200">
-              <a:buFont typeface="Arial" charset="0"/>
-              <a:buChar char="•"/>
-            </a:pPr>
-            <a:endParaRPr lang="en-US" dirty="0" smtClean="0">
-              <a:solidFill>
-                <a:schemeClr val="tx1"/>
-              </a:solidFill>
-            </a:endParaRPr>
-          </a:p>
-          <a:p>
-            <a:pPr algn="ctr"/>
-            <a:r>
-              <a:rPr lang="en-US" b="1" dirty="0" smtClean="0">
-                <a:solidFill>
-                  <a:srgbClr val="FF0000"/>
-                </a:solidFill>
-              </a:rPr>
-              <a:t>REMEMBER TO SHUTDOWN YOUR RASPBERRY PI</a:t>
-            </a:r>
-          </a:p>
-          <a:p>
-            <a:pPr algn="ctr"/>
-            <a:r>
-              <a:rPr lang="en-US" b="1" dirty="0" smtClean="0">
-                <a:solidFill>
-                  <a:srgbClr val="FF0000"/>
-                </a:solidFill>
-              </a:rPr>
-              <a:t>DO NOT POWER IT OFF UNTIL YOU SHUTDOWN</a:t>
-            </a:r>
-            <a:endParaRPr lang="en-US" b="1" dirty="0">
-              <a:solidFill>
-                <a:srgbClr val="FF0000"/>
-              </a:solidFill>
-            </a:endParaRPr>
-          </a:p>
-        </p:txBody>
-      </p:sp>
-    </p:spTree>
-    <p:extLst>
-      <p:ext uri="{BB962C8B-B14F-4D97-AF65-F5344CB8AC3E}">
-        <p14:creationId xmlns:p14="http://schemas.microsoft.com/office/powerpoint/2010/main" val="2013213598"/>
-      </p:ext>
-    </p:extLst>
-  </p:cSld>
-  <p:clrMapOvr>
-    <a:masterClrMapping/>
-  </p:clrMapOvr>
-</p:sld>
-</file>
-
-<file path=ppt/slides/slide29.xml><?xml version="1.0" encoding="utf-8"?>
-<p:sld xmlns:a="http://schemas.openxmlformats.org/drawingml/2006/main" xmlns:r="http://schemas.openxmlformats.org/officeDocument/2006/relationships" xmlns:p="http://schemas.openxmlformats.org/presentationml/2006/main">
-  <p:cSld>
-    <p:spTree>
-      <p:nvGrpSpPr>
-        <p:cNvPr id="1" name=""/>
-        <p:cNvGrpSpPr/>
-        <p:nvPr/>
-      </p:nvGrpSpPr>
-      <p:grpSpPr>
-        <a:xfrm>
-          <a:off x="0" y="0"/>
-          <a:ext cx="0" cy="0"/>
-          <a:chOff x="0" y="0"/>
-          <a:chExt cx="0" cy="0"/>
-        </a:xfrm>
-      </p:grpSpPr>
-      <p:sp>
-        <p:nvSpPr>
-          <p:cNvPr id="4" name="Title 3"/>
-          <p:cNvSpPr>
-            <a:spLocks noGrp="1"/>
-          </p:cNvSpPr>
-          <p:nvPr>
-            <p:ph type="title"/>
-          </p:nvPr>
-        </p:nvSpPr>
-        <p:spPr>
-          <a:xfrm>
-            <a:off x="685800" y="2381693"/>
-            <a:ext cx="10820400" cy="1174306"/>
-          </a:xfrm>
-        </p:spPr>
-        <p:txBody>
-          <a:bodyPr/>
-          <a:lstStyle/>
-          <a:p>
-            <a:pPr algn="ctr"/>
-            <a:r>
-              <a:rPr lang="en-US" dirty="0" smtClean="0"/>
-              <a:t>Questions or comments?</a:t>
-            </a:r>
-            <a:endParaRPr lang="en-US" dirty="0"/>
-          </a:p>
-        </p:txBody>
-      </p:sp>
-    </p:spTree>
-    <p:extLst>
-      <p:ext uri="{BB962C8B-B14F-4D97-AF65-F5344CB8AC3E}">
-        <p14:creationId xmlns:p14="http://schemas.microsoft.com/office/powerpoint/2010/main" val="408753220"/>
-      </p:ext>
-    </p:extLst>
-  </p:cSld>
-  <p:clrMapOvr>
-    <a:masterClrMapping/>
-  </p:clrMapOvr>
-  <p:timing>
-    <p:tnLst>
-      <p:par>
-        <p:cTn id="1" dur="indefinite" restart="never" nodeType="tmRoot"/>
-      </p:par>
-    </p:tnLst>
-  </p:timing>
-</p:sld>
-</file>
-
 <file path=ppt/slides/slide3.xml><?xml version="1.0" encoding="utf-8"?>
 <p:sld xmlns:a="http://schemas.openxmlformats.org/drawingml/2006/main" xmlns:r="http://schemas.openxmlformats.org/officeDocument/2006/relationships" xmlns:p="http://schemas.openxmlformats.org/presentationml/2006/main">
   <p:cSld>
@@ -9893,6 +10238,257 @@
     <p:extLst>
       <p:ext uri="{BB962C8B-B14F-4D97-AF65-F5344CB8AC3E}">
         <p14:creationId xmlns:p14="http://schemas.microsoft.com/office/powerpoint/2010/main" val="919817583"/>
+      </p:ext>
+    </p:extLst>
+  </p:cSld>
+  <p:clrMapOvr>
+    <a:masterClrMapping/>
+  </p:clrMapOvr>
+  <p:timing>
+    <p:tnLst>
+      <p:par>
+        <p:cTn id="1" dur="indefinite" restart="never" nodeType="tmRoot"/>
+      </p:par>
+    </p:tnLst>
+  </p:timing>
+</p:sld>
+</file>
+
+<file path=ppt/slides/slide30.xml><?xml version="1.0" encoding="utf-8"?>
+<p:sld xmlns:a="http://schemas.openxmlformats.org/drawingml/2006/main" xmlns:r="http://schemas.openxmlformats.org/officeDocument/2006/relationships" xmlns:p="http://schemas.openxmlformats.org/presentationml/2006/main">
+  <p:cSld>
+    <p:spTree>
+      <p:nvGrpSpPr>
+        <p:cNvPr id="1" name=""/>
+        <p:cNvGrpSpPr/>
+        <p:nvPr/>
+      </p:nvGrpSpPr>
+      <p:grpSpPr>
+        <a:xfrm>
+          <a:off x="0" y="0"/>
+          <a:ext cx="0" cy="0"/>
+          <a:chOff x="0" y="0"/>
+          <a:chExt cx="0" cy="0"/>
+        </a:xfrm>
+      </p:grpSpPr>
+      <p:sp>
+        <p:nvSpPr>
+          <p:cNvPr id="4" name="Title 3"/>
+          <p:cNvSpPr>
+            <a:spLocks noGrp="1"/>
+          </p:cNvSpPr>
+          <p:nvPr>
+            <p:ph type="title"/>
+          </p:nvPr>
+        </p:nvSpPr>
+        <p:spPr>
+          <a:xfrm>
+            <a:off x="963084" y="1542098"/>
+            <a:ext cx="10363200" cy="1362075"/>
+          </a:xfrm>
+        </p:spPr>
+        <p:txBody>
+          <a:bodyPr/>
+          <a:lstStyle/>
+          <a:p>
+            <a:pPr algn="ctr"/>
+            <a:r>
+              <a:rPr lang="en-US" dirty="0" smtClean="0"/>
+              <a:t>LAB TIME </a:t>
+            </a:r>
+            <a:endParaRPr lang="en-US" dirty="0"/>
+          </a:p>
+        </p:txBody>
+      </p:sp>
+      <p:sp>
+        <p:nvSpPr>
+          <p:cNvPr id="2" name="Text Placeholder 1"/>
+          <p:cNvSpPr>
+            <a:spLocks noGrp="1"/>
+          </p:cNvSpPr>
+          <p:nvPr>
+            <p:ph type="body" idx="1"/>
+          </p:nvPr>
+        </p:nvSpPr>
+        <p:spPr>
+          <a:xfrm>
+            <a:off x="963084" y="2621281"/>
+            <a:ext cx="10363200" cy="3403600"/>
+          </a:xfrm>
+        </p:spPr>
+        <p:txBody>
+          <a:bodyPr>
+            <a:normAutofit fontScale="92500" lnSpcReduction="10000"/>
+          </a:bodyPr>
+          <a:lstStyle/>
+          <a:p>
+            <a:pPr marL="457200" indent="-457200">
+              <a:buFont typeface="Arial" charset="0"/>
+              <a:buChar char="•"/>
+            </a:pPr>
+            <a:r>
+              <a:rPr lang="en-US" dirty="0" smtClean="0">
+                <a:solidFill>
+                  <a:schemeClr val="tx1"/>
+                </a:solidFill>
+              </a:rPr>
+              <a:t>Use the remainder of class to explore the ice house code. Try different values for the blocks and size of the house. Make as many houses as you want!</a:t>
+            </a:r>
+            <a:endParaRPr lang="en-US" dirty="0">
+              <a:solidFill>
+                <a:schemeClr val="tx1"/>
+              </a:solidFill>
+            </a:endParaRPr>
+          </a:p>
+          <a:p>
+            <a:pPr marL="457200" indent="-457200">
+              <a:buFont typeface="Arial" charset="0"/>
+              <a:buChar char="•"/>
+            </a:pPr>
+            <a:r>
+              <a:rPr lang="en-US" dirty="0" smtClean="0">
+                <a:solidFill>
+                  <a:schemeClr val="tx1"/>
+                </a:solidFill>
+              </a:rPr>
+              <a:t>You can leave when you’re finished.</a:t>
+            </a:r>
+            <a:endParaRPr lang="en-US" dirty="0">
+              <a:solidFill>
+                <a:schemeClr val="tx1"/>
+              </a:solidFill>
+            </a:endParaRPr>
+          </a:p>
+          <a:p>
+            <a:pPr marL="457200" indent="-457200">
+              <a:buFont typeface="Arial" charset="0"/>
+              <a:buChar char="•"/>
+            </a:pPr>
+            <a:r>
+              <a:rPr lang="en-US" b="1" dirty="0" smtClean="0">
+                <a:solidFill>
+                  <a:schemeClr val="tx1"/>
+                </a:solidFill>
+              </a:rPr>
+              <a:t>DO NOT DISTURB </a:t>
+            </a:r>
+            <a:r>
+              <a:rPr lang="en-US" dirty="0" smtClean="0">
+                <a:solidFill>
+                  <a:schemeClr val="tx1"/>
+                </a:solidFill>
+              </a:rPr>
+              <a:t>the other classes!</a:t>
+            </a:r>
+            <a:endParaRPr lang="en-US" b="1" dirty="0">
+              <a:solidFill>
+                <a:schemeClr val="tx1"/>
+              </a:solidFill>
+            </a:endParaRPr>
+          </a:p>
+          <a:p>
+            <a:pPr marL="457200" indent="-457200">
+              <a:buFont typeface="Arial" charset="0"/>
+              <a:buChar char="•"/>
+            </a:pPr>
+            <a:endParaRPr lang="en-US" dirty="0" smtClean="0">
+              <a:solidFill>
+                <a:schemeClr val="tx1"/>
+              </a:solidFill>
+            </a:endParaRPr>
+          </a:p>
+          <a:p>
+            <a:pPr algn="ctr"/>
+            <a:r>
+              <a:rPr lang="en-US" b="1" dirty="0" smtClean="0">
+                <a:solidFill>
+                  <a:srgbClr val="FF0000"/>
+                </a:solidFill>
+              </a:rPr>
+              <a:t>REMEMBER TO SHUTDOWN YOUR RASPBERRY PI</a:t>
+            </a:r>
+          </a:p>
+          <a:p>
+            <a:pPr algn="ctr"/>
+            <a:r>
+              <a:rPr lang="en-US" b="1" dirty="0" smtClean="0">
+                <a:solidFill>
+                  <a:srgbClr val="FF0000"/>
+                </a:solidFill>
+              </a:rPr>
+              <a:t>DO NOT POWER IT OFF UNTIL YOU SHUTDOWN</a:t>
+            </a:r>
+            <a:endParaRPr lang="en-US" b="1" dirty="0">
+              <a:solidFill>
+                <a:srgbClr val="FF0000"/>
+              </a:solidFill>
+            </a:endParaRPr>
+          </a:p>
+        </p:txBody>
+      </p:sp>
+    </p:spTree>
+    <p:extLst>
+      <p:ext uri="{BB962C8B-B14F-4D97-AF65-F5344CB8AC3E}">
+        <p14:creationId xmlns:p14="http://schemas.microsoft.com/office/powerpoint/2010/main" val="2013213598"/>
+      </p:ext>
+    </p:extLst>
+  </p:cSld>
+  <p:clrMapOvr>
+    <a:masterClrMapping/>
+  </p:clrMapOvr>
+</p:sld>
+</file>
+
+<file path=ppt/slides/slide31.xml><?xml version="1.0" encoding="utf-8"?>
+<p:sld xmlns:a="http://schemas.openxmlformats.org/drawingml/2006/main" xmlns:r="http://schemas.openxmlformats.org/officeDocument/2006/relationships" xmlns:p="http://schemas.openxmlformats.org/presentationml/2006/main">
+  <p:cSld>
+    <p:spTree>
+      <p:nvGrpSpPr>
+        <p:cNvPr id="1" name=""/>
+        <p:cNvGrpSpPr/>
+        <p:nvPr/>
+      </p:nvGrpSpPr>
+      <p:grpSpPr>
+        <a:xfrm>
+          <a:off x="0" y="0"/>
+          <a:ext cx="0" cy="0"/>
+          <a:chOff x="0" y="0"/>
+          <a:chExt cx="0" cy="0"/>
+        </a:xfrm>
+      </p:grpSpPr>
+      <p:sp>
+        <p:nvSpPr>
+          <p:cNvPr id="4" name="Title 3"/>
+          <p:cNvSpPr>
+            <a:spLocks noGrp="1"/>
+          </p:cNvSpPr>
+          <p:nvPr>
+            <p:ph type="title"/>
+          </p:nvPr>
+        </p:nvSpPr>
+        <p:spPr>
+          <a:xfrm>
+            <a:off x="685800" y="2381693"/>
+            <a:ext cx="10820400" cy="1174306"/>
+          </a:xfrm>
+        </p:spPr>
+        <p:txBody>
+          <a:bodyPr/>
+          <a:lstStyle/>
+          <a:p>
+            <a:pPr algn="ctr"/>
+            <a:r>
+              <a:rPr lang="en-US" dirty="0" smtClean="0"/>
+              <a:t>Questions or comments?</a:t>
+            </a:r>
+            <a:endParaRPr lang="en-US" dirty="0"/>
+          </a:p>
+        </p:txBody>
+      </p:sp>
+    </p:spTree>
+    <p:extLst>
+      <p:ext uri="{BB962C8B-B14F-4D97-AF65-F5344CB8AC3E}">
+        <p14:creationId xmlns:p14="http://schemas.microsoft.com/office/powerpoint/2010/main" val="408753220"/>
       </p:ext>
     </p:extLst>
   </p:cSld>
@@ -10005,6 +10601,13 @@
   <p:clrMapOvr>
     <a:masterClrMapping/>
   </p:clrMapOvr>
+  <p:timing>
+    <p:tnLst>
+      <p:par>
+        <p:cTn id="1" dur="indefinite" restart="never" nodeType="tmRoot"/>
+      </p:par>
+    </p:tnLst>
+  </p:timing>
 </p:sld>
 </file>
 
@@ -10155,6 +10758,13 @@
   <p:clrMapOvr>
     <a:masterClrMapping/>
   </p:clrMapOvr>
+  <p:timing>
+    <p:tnLst>
+      <p:par>
+        <p:cTn id="1" dur="indefinite" restart="never" nodeType="tmRoot"/>
+      </p:par>
+    </p:tnLst>
+  </p:timing>
 </p:sld>
 </file>
 
@@ -10280,6 +10890,13 @@
   <p:clrMapOvr>
     <a:masterClrMapping/>
   </p:clrMapOvr>
+  <p:timing>
+    <p:tnLst>
+      <p:par>
+        <p:cTn id="1" dur="indefinite" restart="never" nodeType="tmRoot"/>
+      </p:par>
+    </p:tnLst>
+  </p:timing>
 </p:sld>
 </file>
 
@@ -10336,13 +10953,21 @@
         <p:spPr/>
         <p:txBody>
           <a:bodyPr>
-            <a:normAutofit fontScale="85000" lnSpcReduction="20000"/>
+            <a:normAutofit fontScale="77500" lnSpcReduction="20000"/>
           </a:bodyPr>
           <a:lstStyle/>
           <a:p>
             <a:r>
               <a:rPr lang="en-US" dirty="0"/>
-              <a:t>The ancients did not classify their gemstones by analyzing their composition and crystalline forms: names were given in accordance with their color, use or their country of origin. </a:t>
+              <a:t>The ancients did not classify their gemstones by analyzing their composition and crystalline forms: names were given in accordance with their color, </a:t>
+            </a:r>
+            <a:r>
+              <a:rPr lang="en-US" dirty="0" smtClean="0"/>
+              <a:t>use, </a:t>
+            </a:r>
+            <a:r>
+              <a:rPr lang="en-US" dirty="0"/>
+              <a:t>or their country of origin. </a:t>
             </a:r>
           </a:p>
           <a:p>
@@ -10367,11 +10992,22 @@
             </a:r>
             <a:r>
               <a:rPr lang="en-US" dirty="0"/>
-              <a:t>problem is nomenclature; names having changed in the course of time: thus the ancient chrysolite is topaz, sapphire is lazuli, etc. </a:t>
-            </a:r>
-            <a:r>
-              <a:rPr lang="en-US" dirty="0" smtClean="0"/>
-              <a:t>We’ve already learned there were 12 stones on the priest’s breastplate representing the 12 tribes, but in Revelation, there are also 12 stones we should consider.</a:t>
+              <a:t>problem is nomenclature; names having changed in the course of time: thus the ancient chrysolite is topaz, sapphire is lazuli, etc</a:t>
+            </a:r>
+            <a:r>
+              <a:rPr lang="en-US"/>
+              <a:t>. </a:t>
+            </a:r>
+            <a:endParaRPr lang="en-US" smtClean="0"/>
+          </a:p>
+          <a:p>
+            <a:r>
+              <a:rPr lang="en-US" smtClean="0"/>
+              <a:t>We’ve </a:t>
+            </a:r>
+            <a:r>
+              <a:rPr lang="en-US" dirty="0" smtClean="0"/>
+              <a:t>already learned there were 12 stones on the priest’s breastplate representing the 12 tribes, but in Revelation, there are also 12 stones we should consider.</a:t>
             </a:r>
             <a:endParaRPr lang="en-US" dirty="0"/>
           </a:p>
@@ -10390,6 +11026,13 @@
   <p:clrMapOvr>
     <a:masterClrMapping/>
   </p:clrMapOvr>
+  <p:timing>
+    <p:tnLst>
+      <p:par>
+        <p:cTn id="1" dur="indefinite" restart="never" nodeType="tmRoot"/>
+      </p:par>
+    </p:tnLst>
+  </p:timing>
 </p:sld>
 </file>
 
@@ -10490,6 +11133,13 @@
   <p:clrMapOvr>
     <a:masterClrMapping/>
   </p:clrMapOvr>
+  <p:timing>
+    <p:tnLst>
+      <p:par>
+        <p:cTn id="1" dur="indefinite" restart="never" nodeType="tmRoot"/>
+      </p:par>
+    </p:tnLst>
+  </p:timing>
 </p:sld>
 </file>
 

</xml_diff>